<commit_message>
- Inclusão do Trino; Correções no silver_to_gold_batch para o cálculo dos onibus congestionados; Ajustes nas documentações.
</commit_message>
<xml_diff>
--- a/documentacoes/Apresentação_Projeto_Final.pptx
+++ b/documentacoes/Apresentação_Projeto_Final.pptx
@@ -8,13 +8,14 @@
     <p:sldId id="256" r:id="rId2"/>
     <p:sldId id="257" r:id="rId3"/>
     <p:sldId id="258" r:id="rId4"/>
-    <p:sldId id="259" r:id="rId5"/>
-    <p:sldId id="264" r:id="rId6"/>
-    <p:sldId id="265" r:id="rId7"/>
-    <p:sldId id="260" r:id="rId8"/>
-    <p:sldId id="261" r:id="rId9"/>
-    <p:sldId id="262" r:id="rId10"/>
-    <p:sldId id="263" r:id="rId11"/>
+    <p:sldId id="260" r:id="rId5"/>
+    <p:sldId id="266" r:id="rId6"/>
+    <p:sldId id="259" r:id="rId7"/>
+    <p:sldId id="264" r:id="rId8"/>
+    <p:sldId id="265" r:id="rId9"/>
+    <p:sldId id="261" r:id="rId10"/>
+    <p:sldId id="262" r:id="rId11"/>
+    <p:sldId id="263" r:id="rId12"/>
   </p:sldIdLst>
   <p:sldSz cx="12192000" cy="6858000"/>
   <p:notesSz cx="6858000" cy="9144000"/>
@@ -113,6 +114,11 @@
       </a:defRPr>
     </a:lvl9pPr>
   </p:defaultTextStyle>
+  <p:extLst>
+    <p:ext uri="{EFAFB233-063F-42B5-8137-9DF3F51BA10A}">
+      <p15:sldGuideLst xmlns:p15="http://schemas.microsoft.com/office/powerpoint/2012/main"/>
+    </p:ext>
+  </p:extLst>
 </p:presentation>
 </file>
 
@@ -270,7 +276,7 @@
           <a:p>
             <a:fld id="{6444479B-705B-4489-957E-7E8A228BDFA0}" type="datetime1">
               <a:rPr lang="en-US" smtClean="0"/>
-              <a:t>10/27/2025</a:t>
+              <a:t>10/29/2025</a:t>
             </a:fld>
             <a:endParaRPr lang="en-US"/>
           </a:p>
@@ -509,7 +515,7 @@
           <a:p>
             <a:fld id="{7DA38F49-B3E2-4BF0-BEC7-C30D34ABBB8D}" type="datetime1">
               <a:rPr lang="en-US" smtClean="0"/>
-              <a:t>10/27/2025</a:t>
+              <a:t>10/29/2025</a:t>
             </a:fld>
             <a:endParaRPr lang="en-US"/>
           </a:p>
@@ -1365,6 +1371,241 @@
         <p:cNvPr id="1" name="">
           <a:extLst>
             <a:ext uri="{FF2B5EF4-FFF2-40B4-BE49-F238E27FC236}">
+              <a16:creationId xmlns:a16="http://schemas.microsoft.com/office/drawing/2014/main" id="{5D0C3AEF-DE80-C15A-7296-A9C460D97610}"/>
+            </a:ext>
+          </a:extLst>
+        </p:cNvPr>
+        <p:cNvGrpSpPr/>
+        <p:nvPr/>
+      </p:nvGrpSpPr>
+      <p:grpSpPr>
+        <a:xfrm>
+          <a:off x="0" y="0"/>
+          <a:ext cx="0" cy="0"/>
+          <a:chOff x="0" y="0"/>
+          <a:chExt cx="0" cy="0"/>
+        </a:xfrm>
+      </p:grpSpPr>
+      <p:sp>
+        <p:nvSpPr>
+          <p:cNvPr id="2" name="Título 1">
+            <a:extLst>
+              <a:ext uri="{FF2B5EF4-FFF2-40B4-BE49-F238E27FC236}">
+                <a16:creationId xmlns:a16="http://schemas.microsoft.com/office/drawing/2014/main" id="{9784CB44-F52E-2B83-E599-92EC4D8C72C7}"/>
+              </a:ext>
+            </a:extLst>
+          </p:cNvPr>
+          <p:cNvSpPr>
+            <a:spLocks noGrp="1"/>
+          </p:cNvSpPr>
+          <p:nvPr>
+            <p:ph type="ctrTitle"/>
+          </p:nvPr>
+        </p:nvSpPr>
+        <p:spPr>
+          <a:xfrm>
+            <a:off x="640080" y="1371599"/>
+            <a:ext cx="6675120" cy="552451"/>
+          </a:xfrm>
+        </p:spPr>
+        <p:txBody>
+          <a:bodyPr>
+            <a:normAutofit/>
+          </a:bodyPr>
+          <a:lstStyle/>
+          <a:p>
+            <a:r>
+              <a:rPr lang="pt-PT" sz="2800" dirty="0"/>
+              <a:t>Conclusão e Próximos Passos</a:t>
+            </a:r>
+          </a:p>
+        </p:txBody>
+      </p:sp>
+      <p:sp>
+        <p:nvSpPr>
+          <p:cNvPr id="3" name="Subtítulo 2">
+            <a:extLst>
+              <a:ext uri="{FF2B5EF4-FFF2-40B4-BE49-F238E27FC236}">
+                <a16:creationId xmlns:a16="http://schemas.microsoft.com/office/drawing/2014/main" id="{978F12B3-9065-B2EC-A2C5-64BC95007FEF}"/>
+              </a:ext>
+            </a:extLst>
+          </p:cNvPr>
+          <p:cNvSpPr>
+            <a:spLocks noGrp="1"/>
+          </p:cNvSpPr>
+          <p:nvPr>
+            <p:ph type="subTitle" idx="1"/>
+          </p:nvPr>
+        </p:nvSpPr>
+        <p:spPr>
+          <a:xfrm>
+            <a:off x="640080" y="2404871"/>
+            <a:ext cx="11301984" cy="4059937"/>
+          </a:xfrm>
+        </p:spPr>
+        <p:txBody>
+          <a:bodyPr anchor="t">
+            <a:normAutofit fontScale="85000" lnSpcReduction="20000"/>
+          </a:bodyPr>
+          <a:lstStyle/>
+          <a:p>
+            <a:pPr marL="285750" indent="-285750">
+              <a:buFont typeface="Arial" panose="020B0604020202020204" pitchFamily="34" charset="0"/>
+              <a:buChar char="•"/>
+            </a:pPr>
+            <a:r>
+              <a:rPr lang="pt-PT" dirty="0"/>
+              <a:t>O que foi entregue:</a:t>
+            </a:r>
+          </a:p>
+          <a:p>
+            <a:pPr marL="742950" lvl="1" indent="-285750" algn="l">
+              <a:buFont typeface="Arial" panose="020B0604020202020204" pitchFamily="34" charset="0"/>
+              <a:buChar char="•"/>
+            </a:pPr>
+            <a:r>
+              <a:rPr lang="pt-PT" b="1" dirty="0"/>
+              <a:t>Uma plataforma de dados ponta-a-ponta.</a:t>
+            </a:r>
+          </a:p>
+          <a:p>
+            <a:pPr marL="742950" lvl="1" indent="-285750" algn="l">
+              <a:buFont typeface="Arial" panose="020B0604020202020204" pitchFamily="34" charset="0"/>
+              <a:buChar char="•"/>
+            </a:pPr>
+            <a:r>
+              <a:rPr lang="pt-PT" b="1" dirty="0"/>
+              <a:t>Dashboards históricos (Batch) e operacionais (NRT) funcionais.</a:t>
+            </a:r>
+          </a:p>
+          <a:p>
+            <a:pPr marL="742950" lvl="1" indent="-285750" algn="l">
+              <a:buFont typeface="Arial" panose="020B0604020202020204" pitchFamily="34" charset="0"/>
+              <a:buChar char="•"/>
+            </a:pPr>
+            <a:r>
+              <a:rPr lang="pt-PT" b="1" dirty="0"/>
+              <a:t>Uma "fonte da verdade" (Gold Lakehouse) confiável e escalável.</a:t>
+            </a:r>
+          </a:p>
+          <a:p>
+            <a:pPr marL="285750" indent="-285750">
+              <a:buFont typeface="Arial" panose="020B0604020202020204" pitchFamily="34" charset="0"/>
+              <a:buChar char="•"/>
+            </a:pPr>
+            <a:endParaRPr lang="pt-PT" dirty="0"/>
+          </a:p>
+          <a:p>
+            <a:pPr marL="285750" indent="-285750">
+              <a:buFont typeface="Arial" panose="020B0604020202020204" pitchFamily="34" charset="0"/>
+              <a:buChar char="•"/>
+            </a:pPr>
+            <a:r>
+              <a:rPr lang="pt-PT" dirty="0"/>
+              <a:t>Próximos Passos:</a:t>
+            </a:r>
+          </a:p>
+          <a:p>
+            <a:pPr marL="742950" lvl="1" indent="-285750" algn="l">
+              <a:buFont typeface="Arial" panose="020B0604020202020204" pitchFamily="34" charset="0"/>
+              <a:buChar char="•"/>
+            </a:pPr>
+            <a:r>
+              <a:rPr lang="pt-PT" b="1" dirty="0"/>
+              <a:t>Enriquecer a camada Gold: </a:t>
+            </a:r>
+            <a:r>
+              <a:rPr lang="pt-PT" dirty="0"/>
+              <a:t>mais KPIs e informações.</a:t>
+            </a:r>
+          </a:p>
+          <a:p>
+            <a:pPr marL="742950" lvl="1" indent="-285750" algn="l">
+              <a:buFont typeface="Arial" panose="020B0604020202020204" pitchFamily="34" charset="0"/>
+              <a:buChar char="•"/>
+            </a:pPr>
+            <a:r>
+              <a:rPr lang="pt-PT" b="1" dirty="0"/>
+              <a:t>PoC para Cloud: </a:t>
+            </a:r>
+            <a:r>
+              <a:rPr lang="pt-PT" dirty="0"/>
+              <a:t>migração para AWS, </a:t>
+            </a:r>
+            <a:r>
+              <a:rPr lang="pt-PT" dirty="0" err="1"/>
+              <a:t>Azure</a:t>
+            </a:r>
+            <a:r>
+              <a:rPr lang="pt-PT" dirty="0"/>
+              <a:t> ou GCP.</a:t>
+            </a:r>
+          </a:p>
+          <a:p>
+            <a:pPr marL="742950" lvl="1" indent="-285750" algn="l">
+              <a:buFont typeface="Arial" panose="020B0604020202020204" pitchFamily="34" charset="0"/>
+              <a:buChar char="•"/>
+            </a:pPr>
+            <a:r>
+              <a:rPr lang="pt-PT" b="1" dirty="0"/>
+              <a:t>Alertas: </a:t>
+            </a:r>
+            <a:r>
+              <a:rPr lang="pt-PT" dirty="0"/>
+              <a:t>Criar alertas automáticos (Ex: "Linha 8000 está com velocidade abaixo de 5km/h há 10 minutos").</a:t>
+            </a:r>
+          </a:p>
+          <a:p>
+            <a:pPr marL="742950" lvl="1" indent="-285750" algn="l">
+              <a:buFont typeface="Arial" panose="020B0604020202020204" pitchFamily="34" charset="0"/>
+              <a:buChar char="•"/>
+            </a:pPr>
+            <a:r>
+              <a:rPr lang="pt-PT" b="1" dirty="0"/>
+              <a:t>Machine Learning: </a:t>
+            </a:r>
+            <a:r>
+              <a:rPr lang="pt-PT" dirty="0"/>
+              <a:t>Usar o histórico gerado de velocidade e posições para treinar modelos de previsão de chegada (ETA).</a:t>
+            </a:r>
+          </a:p>
+          <a:p>
+            <a:pPr marL="742950" lvl="1" indent="-285750" algn="l">
+              <a:buFont typeface="Arial" panose="020B0604020202020204" pitchFamily="34" charset="0"/>
+              <a:buChar char="•"/>
+            </a:pPr>
+            <a:r>
+              <a:rPr lang="pt-PT" b="1" dirty="0"/>
+              <a:t>Novos Dashboards: </a:t>
+            </a:r>
+            <a:r>
+              <a:rPr lang="pt-PT" dirty="0"/>
+              <a:t>Análise de performance por concessionária, por período do dia, etc.</a:t>
+            </a:r>
+          </a:p>
+        </p:txBody>
+      </p:sp>
+    </p:spTree>
+    <p:extLst>
+      <p:ext uri="{BB962C8B-B14F-4D97-AF65-F5344CB8AC3E}">
+        <p14:creationId xmlns:p14="http://schemas.microsoft.com/office/powerpoint/2010/main" val="3686714567"/>
+      </p:ext>
+    </p:extLst>
+  </p:cSld>
+  <p:clrMapOvr>
+    <a:masterClrMapping/>
+  </p:clrMapOvr>
+</p:sld>
+</file>
+
+<file path=ppt/slides/slide11.xml><?xml version="1.0" encoding="utf-8"?>
+<p:sld xmlns:a="http://schemas.openxmlformats.org/drawingml/2006/main" xmlns:r="http://schemas.openxmlformats.org/officeDocument/2006/relationships" xmlns:p="http://schemas.openxmlformats.org/presentationml/2006/main">
+  <p:cSld>
+    <p:spTree>
+      <p:nvGrpSpPr>
+        <p:cNvPr id="1" name="">
+          <a:extLst>
+            <a:ext uri="{FF2B5EF4-FFF2-40B4-BE49-F238E27FC236}">
               <a16:creationId xmlns:a16="http://schemas.microsoft.com/office/drawing/2014/main" id="{A3E66FE3-A59A-6CD1-E378-2A9CFB9C1463}"/>
             </a:ext>
           </a:extLst>
@@ -1409,9 +1650,10 @@
           <a:lstStyle/>
           <a:p>
             <a:r>
-              <a:rPr lang="pt-PT" sz="2800" dirty="0"/>
+              <a:rPr lang="pt-PT" sz="2800"/>
               <a:t>Perguntas</a:t>
             </a:r>
+            <a:endParaRPr lang="pt-PT" sz="2800" dirty="0"/>
           </a:p>
         </p:txBody>
       </p:sp>
@@ -1728,7 +1970,7 @@
             </a:pPr>
             <a:r>
               <a:rPr lang="pt-PT" dirty="0"/>
-              <a:t>Objetivo 1: Visão Estratégica (Batch)</a:t>
+              <a:t>Objetivo 1: Visão Estratégica (Pipeline Batch)</a:t>
             </a:r>
           </a:p>
           <a:p>
@@ -1765,7 +2007,7 @@
             </a:pPr>
             <a:r>
               <a:rPr lang="pt-PT" dirty="0"/>
-              <a:t>Objetivo 2: Visão Operacional (Streaming)</a:t>
+              <a:t>Objetivo 2: Visão Operacional (Pipeline Streaming - NRT)</a:t>
             </a:r>
           </a:p>
           <a:p>
@@ -1828,7 +2070,7 @@
             </a:pPr>
             <a:r>
               <a:rPr lang="pt-PT" dirty="0"/>
-              <a:t>Construir uma Arquitetura Medalhão, Híbrida Batch/Streaming que suporte ambas visões.</a:t>
+              <a:t>Construir uma Arquitetura Medalhão, Híbrida Batch/Streaming - NRT que suporte ambas visões.</a:t>
             </a:r>
           </a:p>
         </p:txBody>
@@ -1847,6 +2089,387 @@
 </file>
 
 <file path=ppt/slides/slide4.xml><?xml version="1.0" encoding="utf-8"?>
+<p:sld xmlns:a="http://schemas.openxmlformats.org/drawingml/2006/main" xmlns:r="http://schemas.openxmlformats.org/officeDocument/2006/relationships" xmlns:p="http://schemas.openxmlformats.org/presentationml/2006/main">
+  <p:cSld>
+    <p:spTree>
+      <p:nvGrpSpPr>
+        <p:cNvPr id="1" name="">
+          <a:extLst>
+            <a:ext uri="{FF2B5EF4-FFF2-40B4-BE49-F238E27FC236}">
+              <a16:creationId xmlns:a16="http://schemas.microsoft.com/office/drawing/2014/main" id="{958E1628-84DB-0C79-C56E-4C057C54D40E}"/>
+            </a:ext>
+          </a:extLst>
+        </p:cNvPr>
+        <p:cNvGrpSpPr/>
+        <p:nvPr/>
+      </p:nvGrpSpPr>
+      <p:grpSpPr>
+        <a:xfrm>
+          <a:off x="0" y="0"/>
+          <a:ext cx="0" cy="0"/>
+          <a:chOff x="0" y="0"/>
+          <a:chExt cx="0" cy="0"/>
+        </a:xfrm>
+      </p:grpSpPr>
+      <p:sp>
+        <p:nvSpPr>
+          <p:cNvPr id="2" name="Título 1">
+            <a:extLst>
+              <a:ext uri="{FF2B5EF4-FFF2-40B4-BE49-F238E27FC236}">
+                <a16:creationId xmlns:a16="http://schemas.microsoft.com/office/drawing/2014/main" id="{B9998F3C-5D5C-9F29-EE6E-9C1CDE15817E}"/>
+              </a:ext>
+            </a:extLst>
+          </p:cNvPr>
+          <p:cNvSpPr>
+            <a:spLocks noGrp="1"/>
+          </p:cNvSpPr>
+          <p:nvPr>
+            <p:ph type="ctrTitle"/>
+          </p:nvPr>
+        </p:nvSpPr>
+        <p:spPr>
+          <a:xfrm>
+            <a:off x="640080" y="1371599"/>
+            <a:ext cx="6675120" cy="552451"/>
+          </a:xfrm>
+        </p:spPr>
+        <p:txBody>
+          <a:bodyPr>
+            <a:normAutofit/>
+          </a:bodyPr>
+          <a:lstStyle/>
+          <a:p>
+            <a:r>
+              <a:rPr lang="pt-PT" sz="2800" dirty="0"/>
+              <a:t>Objetivo 1 - Pipeline Batch (Lote)</a:t>
+            </a:r>
+          </a:p>
+        </p:txBody>
+      </p:sp>
+      <p:sp>
+        <p:nvSpPr>
+          <p:cNvPr id="3" name="Subtítulo 2">
+            <a:extLst>
+              <a:ext uri="{FF2B5EF4-FFF2-40B4-BE49-F238E27FC236}">
+                <a16:creationId xmlns:a16="http://schemas.microsoft.com/office/drawing/2014/main" id="{47F6C3E8-075B-51FF-7A3D-0EEAD5CCAF0B}"/>
+              </a:ext>
+            </a:extLst>
+          </p:cNvPr>
+          <p:cNvSpPr>
+            <a:spLocks noGrp="1"/>
+          </p:cNvSpPr>
+          <p:nvPr>
+            <p:ph type="subTitle" idx="1"/>
+          </p:nvPr>
+        </p:nvSpPr>
+        <p:spPr>
+          <a:xfrm>
+            <a:off x="748200" y="4977249"/>
+            <a:ext cx="11301984" cy="1478871"/>
+          </a:xfrm>
+        </p:spPr>
+        <p:txBody>
+          <a:bodyPr anchor="t">
+            <a:normAutofit fontScale="77500" lnSpcReduction="20000"/>
+          </a:bodyPr>
+          <a:lstStyle/>
+          <a:p>
+            <a:pPr marL="285750" indent="-285750">
+              <a:buFont typeface="Arial" panose="020B0604020202020204" pitchFamily="34" charset="0"/>
+              <a:buChar char="•"/>
+            </a:pPr>
+            <a:r>
+              <a:rPr lang="pt-PT" dirty="0"/>
+              <a:t>Executado no minuto 5 de cada hora, processando movimentos da hora anterior</a:t>
+            </a:r>
+          </a:p>
+          <a:p>
+            <a:pPr marL="285750" indent="-285750">
+              <a:buFont typeface="Arial" panose="020B0604020202020204" pitchFamily="34" charset="0"/>
+              <a:buChar char="•"/>
+            </a:pPr>
+            <a:r>
+              <a:rPr lang="pt-PT" dirty="0"/>
+              <a:t>Coleta e limpeza (Bronze -&gt; Silver)</a:t>
+            </a:r>
+          </a:p>
+          <a:p>
+            <a:pPr marL="285750" indent="-285750">
+              <a:buFont typeface="Arial" panose="020B0604020202020204" pitchFamily="34" charset="0"/>
+              <a:buChar char="•"/>
+            </a:pPr>
+            <a:r>
+              <a:rPr lang="pt-PT" dirty="0"/>
+              <a:t>Agregação e consolidação dos </a:t>
+            </a:r>
+            <a:r>
+              <a:rPr lang="pt-PT" dirty="0" err="1"/>
+              <a:t>kpis</a:t>
+            </a:r>
+            <a:r>
+              <a:rPr lang="pt-PT" dirty="0"/>
+              <a:t> (Silver -&gt; Gold/</a:t>
+            </a:r>
+            <a:r>
+              <a:rPr lang="pt-PT" dirty="0" err="1"/>
+              <a:t>lakehouse</a:t>
+            </a:r>
+            <a:r>
+              <a:rPr lang="pt-PT" dirty="0"/>
+              <a:t>)</a:t>
+            </a:r>
+          </a:p>
+          <a:p>
+            <a:pPr marL="285750" indent="-285750">
+              <a:buFont typeface="Arial" panose="020B0604020202020204" pitchFamily="34" charset="0"/>
+              <a:buChar char="•"/>
+            </a:pPr>
+            <a:r>
+              <a:rPr lang="pt-PT" dirty="0"/>
+              <a:t>Entrega de dados (gold/Lakehouse -&gt; </a:t>
+            </a:r>
+            <a:r>
+              <a:rPr lang="pt-PT" dirty="0" err="1"/>
+              <a:t>Postgresql</a:t>
+            </a:r>
+            <a:r>
+              <a:rPr lang="pt-PT" dirty="0"/>
+              <a:t>)</a:t>
+            </a:r>
+          </a:p>
+          <a:p>
+            <a:endParaRPr lang="pt-PT" dirty="0"/>
+          </a:p>
+        </p:txBody>
+      </p:sp>
+      <p:pic>
+        <p:nvPicPr>
+          <p:cNvPr id="5" name="Imagem 4">
+            <a:extLst>
+              <a:ext uri="{FF2B5EF4-FFF2-40B4-BE49-F238E27FC236}">
+                <a16:creationId xmlns:a16="http://schemas.microsoft.com/office/drawing/2014/main" id="{956799FB-7F2C-A827-66C4-AC4799495012}"/>
+              </a:ext>
+            </a:extLst>
+          </p:cNvPr>
+          <p:cNvPicPr>
+            <a:picLocks noChangeAspect="1"/>
+          </p:cNvPicPr>
+          <p:nvPr/>
+        </p:nvPicPr>
+        <p:blipFill>
+          <a:blip r:embed="rId2"/>
+          <a:stretch>
+            <a:fillRect/>
+          </a:stretch>
+        </p:blipFill>
+        <p:spPr>
+          <a:xfrm>
+            <a:off x="640080" y="2105911"/>
+            <a:ext cx="10061750" cy="2646178"/>
+          </a:xfrm>
+          <a:prstGeom prst="rect">
+            <a:avLst/>
+          </a:prstGeom>
+        </p:spPr>
+      </p:pic>
+    </p:spTree>
+    <p:extLst>
+      <p:ext uri="{BB962C8B-B14F-4D97-AF65-F5344CB8AC3E}">
+        <p14:creationId xmlns:p14="http://schemas.microsoft.com/office/powerpoint/2010/main" val="1616817245"/>
+      </p:ext>
+    </p:extLst>
+  </p:cSld>
+  <p:clrMapOvr>
+    <a:masterClrMapping/>
+  </p:clrMapOvr>
+</p:sld>
+</file>
+
+<file path=ppt/slides/slide5.xml><?xml version="1.0" encoding="utf-8"?>
+<p:sld xmlns:a="http://schemas.openxmlformats.org/drawingml/2006/main" xmlns:r="http://schemas.openxmlformats.org/officeDocument/2006/relationships" xmlns:p="http://schemas.openxmlformats.org/presentationml/2006/main">
+  <p:cSld>
+    <p:spTree>
+      <p:nvGrpSpPr>
+        <p:cNvPr id="1" name="">
+          <a:extLst>
+            <a:ext uri="{FF2B5EF4-FFF2-40B4-BE49-F238E27FC236}">
+              <a16:creationId xmlns:a16="http://schemas.microsoft.com/office/drawing/2014/main" id="{236063DD-6F4D-3050-38AF-D7F80035F7FC}"/>
+            </a:ext>
+          </a:extLst>
+        </p:cNvPr>
+        <p:cNvGrpSpPr/>
+        <p:nvPr/>
+      </p:nvGrpSpPr>
+      <p:grpSpPr>
+        <a:xfrm>
+          <a:off x="0" y="0"/>
+          <a:ext cx="0" cy="0"/>
+          <a:chOff x="0" y="0"/>
+          <a:chExt cx="0" cy="0"/>
+        </a:xfrm>
+      </p:grpSpPr>
+      <p:sp>
+        <p:nvSpPr>
+          <p:cNvPr id="2" name="Título 1">
+            <a:extLst>
+              <a:ext uri="{FF2B5EF4-FFF2-40B4-BE49-F238E27FC236}">
+                <a16:creationId xmlns:a16="http://schemas.microsoft.com/office/drawing/2014/main" id="{312C37C2-1C77-8746-6A67-36A76A90D898}"/>
+              </a:ext>
+            </a:extLst>
+          </p:cNvPr>
+          <p:cNvSpPr>
+            <a:spLocks noGrp="1"/>
+          </p:cNvSpPr>
+          <p:nvPr>
+            <p:ph type="ctrTitle"/>
+          </p:nvPr>
+        </p:nvSpPr>
+        <p:spPr>
+          <a:xfrm>
+            <a:off x="640080" y="1371599"/>
+            <a:ext cx="6675120" cy="552451"/>
+          </a:xfrm>
+        </p:spPr>
+        <p:txBody>
+          <a:bodyPr>
+            <a:normAutofit/>
+          </a:bodyPr>
+          <a:lstStyle/>
+          <a:p>
+            <a:r>
+              <a:rPr lang="pt-PT" sz="2800" dirty="0"/>
+              <a:t>Objetivo 2 - Pipeline Streaming (NRT)</a:t>
+            </a:r>
+          </a:p>
+        </p:txBody>
+      </p:sp>
+      <p:sp>
+        <p:nvSpPr>
+          <p:cNvPr id="3" name="Subtítulo 2">
+            <a:extLst>
+              <a:ext uri="{FF2B5EF4-FFF2-40B4-BE49-F238E27FC236}">
+                <a16:creationId xmlns:a16="http://schemas.microsoft.com/office/drawing/2014/main" id="{1BF71976-B0C7-1CF3-CB9D-3C6C56AB1923}"/>
+              </a:ext>
+            </a:extLst>
+          </p:cNvPr>
+          <p:cNvSpPr>
+            <a:spLocks noGrp="1"/>
+          </p:cNvSpPr>
+          <p:nvPr>
+            <p:ph type="subTitle" idx="1"/>
+          </p:nvPr>
+        </p:nvSpPr>
+        <p:spPr>
+          <a:xfrm>
+            <a:off x="640080" y="5205046"/>
+            <a:ext cx="11301984" cy="1259762"/>
+          </a:xfrm>
+        </p:spPr>
+        <p:txBody>
+          <a:bodyPr anchor="t">
+            <a:normAutofit fontScale="92500" lnSpcReduction="10000"/>
+          </a:bodyPr>
+          <a:lstStyle/>
+          <a:p>
+            <a:pPr marL="285750" indent="-285750">
+              <a:buFont typeface="Arial" panose="020B0604020202020204" pitchFamily="34" charset="0"/>
+              <a:buChar char="•"/>
+            </a:pPr>
+            <a:r>
+              <a:rPr lang="pt-PT" dirty="0"/>
+              <a:t>Atualiza os dashboards a cada 5 minutos</a:t>
+            </a:r>
+          </a:p>
+          <a:p>
+            <a:pPr marL="285750" indent="-285750">
+              <a:buFont typeface="Arial" panose="020B0604020202020204" pitchFamily="34" charset="0"/>
+              <a:buChar char="•"/>
+            </a:pPr>
+            <a:r>
+              <a:rPr lang="pt-PT" dirty="0"/>
+              <a:t>Coleta e limpeza (</a:t>
+            </a:r>
+            <a:r>
+              <a:rPr lang="pt-PT" dirty="0" err="1"/>
+              <a:t>kafka</a:t>
+            </a:r>
+            <a:r>
+              <a:rPr lang="pt-PT" dirty="0"/>
+              <a:t> -&gt; silver)</a:t>
+            </a:r>
+          </a:p>
+          <a:p>
+            <a:pPr marL="285750" indent="-285750">
+              <a:buFont typeface="Arial" panose="020B0604020202020204" pitchFamily="34" charset="0"/>
+              <a:buChar char="•"/>
+            </a:pPr>
+            <a:r>
+              <a:rPr lang="pt-PT" dirty="0"/>
+              <a:t>Calculo de </a:t>
+            </a:r>
+            <a:r>
+              <a:rPr lang="pt-PT" dirty="0" err="1"/>
+              <a:t>kpis</a:t>
+            </a:r>
+            <a:r>
+              <a:rPr lang="pt-PT" dirty="0"/>
+              <a:t> e entrega de dados (silver -&gt; </a:t>
+            </a:r>
+            <a:r>
+              <a:rPr lang="pt-PT" dirty="0" err="1"/>
+              <a:t>postgresql</a:t>
+            </a:r>
+            <a:r>
+              <a:rPr lang="pt-PT" dirty="0"/>
+              <a:t>)</a:t>
+            </a:r>
+          </a:p>
+        </p:txBody>
+      </p:sp>
+      <p:pic>
+        <p:nvPicPr>
+          <p:cNvPr id="5" name="Imagem 4">
+            <a:extLst>
+              <a:ext uri="{FF2B5EF4-FFF2-40B4-BE49-F238E27FC236}">
+                <a16:creationId xmlns:a16="http://schemas.microsoft.com/office/drawing/2014/main" id="{106A5C82-5F6A-B376-F10D-422DB4D06229}"/>
+              </a:ext>
+            </a:extLst>
+          </p:cNvPr>
+          <p:cNvPicPr>
+            <a:picLocks noChangeAspect="1"/>
+          </p:cNvPicPr>
+          <p:nvPr/>
+        </p:nvPicPr>
+        <p:blipFill>
+          <a:blip r:embed="rId2"/>
+          <a:stretch>
+            <a:fillRect/>
+          </a:stretch>
+        </p:blipFill>
+        <p:spPr>
+          <a:xfrm>
+            <a:off x="562708" y="2167221"/>
+            <a:ext cx="10420141" cy="2794654"/>
+          </a:xfrm>
+          <a:prstGeom prst="rect">
+            <a:avLst/>
+          </a:prstGeom>
+        </p:spPr>
+      </p:pic>
+    </p:spTree>
+    <p:extLst>
+      <p:ext uri="{BB962C8B-B14F-4D97-AF65-F5344CB8AC3E}">
+        <p14:creationId xmlns:p14="http://schemas.microsoft.com/office/powerpoint/2010/main" val="4289548804"/>
+      </p:ext>
+    </p:extLst>
+  </p:cSld>
+  <p:clrMapOvr>
+    <a:masterClrMapping/>
+  </p:clrMapOvr>
+</p:sld>
+</file>
+
+<file path=ppt/slides/slide6.xml><?xml version="1.0" encoding="utf-8"?>
 <p:sld xmlns:a="http://schemas.openxmlformats.org/drawingml/2006/main" xmlns:r="http://schemas.openxmlformats.org/officeDocument/2006/relationships" xmlns:p="http://schemas.openxmlformats.org/presentationml/2006/main">
   <p:cSld>
     <p:spTree>
@@ -1888,7 +2511,7 @@
         <p:spPr>
           <a:xfrm>
             <a:off x="640080" y="1371599"/>
-            <a:ext cx="6675120" cy="552451"/>
+            <a:ext cx="7539278" cy="552451"/>
           </a:xfrm>
         </p:spPr>
         <p:txBody>
@@ -1899,7 +2522,7 @@
           <a:p>
             <a:r>
               <a:rPr lang="pt-PT" sz="2800" dirty="0"/>
-              <a:t>A Arquitetura da Solução (</a:t>
+              <a:t>Objetivo 3 - Arquitetura Unificada (</a:t>
             </a:r>
             <a:r>
               <a:rPr lang="pt-PT" sz="2800" dirty="0" err="1"/>
@@ -1914,10 +2537,10 @@
       </p:sp>
       <p:pic>
         <p:nvPicPr>
-          <p:cNvPr id="11" name="Imagem 10">
-            <a:extLst>
-              <a:ext uri="{FF2B5EF4-FFF2-40B4-BE49-F238E27FC236}">
-                <a16:creationId xmlns:a16="http://schemas.microsoft.com/office/drawing/2014/main" id="{9723E78F-7361-A923-A0A2-EEFA40159F82}"/>
+          <p:cNvPr id="4" name="Imagem 3">
+            <a:extLst>
+              <a:ext uri="{FF2B5EF4-FFF2-40B4-BE49-F238E27FC236}">
+                <a16:creationId xmlns:a16="http://schemas.microsoft.com/office/drawing/2014/main" id="{0DCD828F-16ED-5584-1DF7-2D9806B38784}"/>
               </a:ext>
             </a:extLst>
           </p:cNvPr>
@@ -1934,8 +2557,8 @@
         </p:blipFill>
         <p:spPr>
           <a:xfrm>
-            <a:off x="0" y="2266950"/>
-            <a:ext cx="12192000" cy="4302212"/>
+            <a:off x="797052" y="2144514"/>
+            <a:ext cx="10597896" cy="4038921"/>
           </a:xfrm>
           <a:prstGeom prst="rect">
             <a:avLst/>
@@ -1955,7 +2578,7 @@
 </p:sld>
 </file>
 
-<file path=ppt/slides/slide5.xml><?xml version="1.0" encoding="utf-8"?>
+<file path=ppt/slides/slide7.xml><?xml version="1.0" encoding="utf-8"?>
 <p:sld xmlns:a="http://schemas.openxmlformats.org/drawingml/2006/main" xmlns:r="http://schemas.openxmlformats.org/officeDocument/2006/relationships" xmlns:p="http://schemas.openxmlformats.org/presentationml/2006/main">
   <p:cSld>
     <p:spTree>
@@ -2465,7 +3088,7 @@
 </p:sld>
 </file>
 
-<file path=ppt/slides/slide6.xml><?xml version="1.0" encoding="utf-8"?>
+<file path=ppt/slides/slide8.xml><?xml version="1.0" encoding="utf-8"?>
 <p:sld xmlns:a="http://schemas.openxmlformats.org/drawingml/2006/main" xmlns:r="http://schemas.openxmlformats.org/officeDocument/2006/relationships" xmlns:p="http://schemas.openxmlformats.org/presentationml/2006/main">
   <p:cSld>
     <p:spTree>
@@ -2768,7 +3391,7 @@
         </p:spPr>
         <p:txBody>
           <a:bodyPr vert="horz" lIns="91440" tIns="45720" rIns="91440" bIns="45720" rtlCol="0" anchor="t">
-            <a:normAutofit/>
+            <a:normAutofit fontScale="92500" lnSpcReduction="10000"/>
           </a:bodyPr>
           <a:lstStyle>
             <a:lvl1pPr marL="0" indent="0" algn="l" defTabSz="914400" rtl="0" eaLnBrk="1" latinLnBrk="0" hangingPunct="1">
@@ -2984,6 +3607,16 @@
             <a:r>
               <a:rPr lang="pt-PT" sz="1400" dirty="0"/>
               <a:t>Metabase</a:t>
+            </a:r>
+          </a:p>
+          <a:p>
+            <a:pPr marL="800100" lvl="1" indent="-342900" algn="l">
+              <a:buFont typeface="Courier New" panose="02070309020205020404" pitchFamily="49" charset="0"/>
+              <a:buChar char="o"/>
+            </a:pPr>
+            <a:r>
+              <a:rPr lang="pt-PT" sz="1400" dirty="0"/>
+              <a:t>Trino</a:t>
             </a:r>
           </a:p>
           <a:p>
@@ -3540,10 +4173,10 @@
       </p:pic>
       <p:pic>
         <p:nvPicPr>
-          <p:cNvPr id="30" name="Imagem 29">
-            <a:extLst>
-              <a:ext uri="{FF2B5EF4-FFF2-40B4-BE49-F238E27FC236}">
-                <a16:creationId xmlns:a16="http://schemas.microsoft.com/office/drawing/2014/main" id="{7954A8D3-D3F8-8E68-C3E0-9BE22EEA9EBC}"/>
+          <p:cNvPr id="10" name="Imagem 9">
+            <a:extLst>
+              <a:ext uri="{FF2B5EF4-FFF2-40B4-BE49-F238E27FC236}">
+                <a16:creationId xmlns:a16="http://schemas.microsoft.com/office/drawing/2014/main" id="{8898115A-5B12-4036-1FFE-01A4C05F5BEF}"/>
               </a:ext>
             </a:extLst>
           </p:cNvPr>
@@ -3560,8 +4193,8 @@
         </p:blipFill>
         <p:spPr>
           <a:xfrm>
-            <a:off x="8036773" y="3933193"/>
-            <a:ext cx="2731811" cy="1425919"/>
+            <a:off x="7315200" y="4085653"/>
+            <a:ext cx="4387814" cy="1860206"/>
           </a:xfrm>
           <a:prstGeom prst="rect">
             <a:avLst/>
@@ -3581,200 +4214,7 @@
 </p:sld>
 </file>
 
-<file path=ppt/slides/slide7.xml><?xml version="1.0" encoding="utf-8"?>
-<p:sld xmlns:a="http://schemas.openxmlformats.org/drawingml/2006/main" xmlns:r="http://schemas.openxmlformats.org/officeDocument/2006/relationships" xmlns:p="http://schemas.openxmlformats.org/presentationml/2006/main">
-  <p:cSld>
-    <p:spTree>
-      <p:nvGrpSpPr>
-        <p:cNvPr id="1" name="">
-          <a:extLst>
-            <a:ext uri="{FF2B5EF4-FFF2-40B4-BE49-F238E27FC236}">
-              <a16:creationId xmlns:a16="http://schemas.microsoft.com/office/drawing/2014/main" id="{958E1628-84DB-0C79-C56E-4C057C54D40E}"/>
-            </a:ext>
-          </a:extLst>
-        </p:cNvPr>
-        <p:cNvGrpSpPr/>
-        <p:nvPr/>
-      </p:nvGrpSpPr>
-      <p:grpSpPr>
-        <a:xfrm>
-          <a:off x="0" y="0"/>
-          <a:ext cx="0" cy="0"/>
-          <a:chOff x="0" y="0"/>
-          <a:chExt cx="0" cy="0"/>
-        </a:xfrm>
-      </p:grpSpPr>
-      <p:sp>
-        <p:nvSpPr>
-          <p:cNvPr id="2" name="Título 1">
-            <a:extLst>
-              <a:ext uri="{FF2B5EF4-FFF2-40B4-BE49-F238E27FC236}">
-                <a16:creationId xmlns:a16="http://schemas.microsoft.com/office/drawing/2014/main" id="{B9998F3C-5D5C-9F29-EE6E-9C1CDE15817E}"/>
-              </a:ext>
-            </a:extLst>
-          </p:cNvPr>
-          <p:cNvSpPr>
-            <a:spLocks noGrp="1"/>
-          </p:cNvSpPr>
-          <p:nvPr>
-            <p:ph type="ctrTitle"/>
-          </p:nvPr>
-        </p:nvSpPr>
-        <p:spPr>
-          <a:xfrm>
-            <a:off x="640080" y="1371599"/>
-            <a:ext cx="6675120" cy="552451"/>
-          </a:xfrm>
-        </p:spPr>
-        <p:txBody>
-          <a:bodyPr>
-            <a:normAutofit/>
-          </a:bodyPr>
-          <a:lstStyle/>
-          <a:p>
-            <a:r>
-              <a:rPr lang="pt-PT" sz="2800" dirty="0"/>
-              <a:t>Unindo Os Pipelines Batch e Streaming</a:t>
-            </a:r>
-          </a:p>
-        </p:txBody>
-      </p:sp>
-      <p:sp>
-        <p:nvSpPr>
-          <p:cNvPr id="3" name="Subtítulo 2">
-            <a:extLst>
-              <a:ext uri="{FF2B5EF4-FFF2-40B4-BE49-F238E27FC236}">
-                <a16:creationId xmlns:a16="http://schemas.microsoft.com/office/drawing/2014/main" id="{47F6C3E8-075B-51FF-7A3D-0EEAD5CCAF0B}"/>
-              </a:ext>
-            </a:extLst>
-          </p:cNvPr>
-          <p:cNvSpPr>
-            <a:spLocks noGrp="1"/>
-          </p:cNvSpPr>
-          <p:nvPr>
-            <p:ph type="subTitle" idx="1"/>
-          </p:nvPr>
-        </p:nvSpPr>
-        <p:spPr>
-          <a:xfrm>
-            <a:off x="640080" y="2404871"/>
-            <a:ext cx="11301984" cy="4059937"/>
-          </a:xfrm>
-        </p:spPr>
-        <p:txBody>
-          <a:bodyPr anchor="t">
-            <a:normAutofit fontScale="85000" lnSpcReduction="10000"/>
-          </a:bodyPr>
-          <a:lstStyle/>
-          <a:p>
-            <a:pPr marL="285750" indent="-285750">
-              <a:buFont typeface="Arial" panose="020B0604020202020204" pitchFamily="34" charset="0"/>
-              <a:buChar char="•"/>
-            </a:pPr>
-            <a:r>
-              <a:rPr lang="pt-PT" dirty="0"/>
-              <a:t>Como o Streaming (</a:t>
-            </a:r>
-            <a:r>
-              <a:rPr lang="pt-PT" dirty="0" err="1"/>
-              <a:t>nrt</a:t>
-            </a:r>
-            <a:r>
-              <a:rPr lang="pt-PT" dirty="0"/>
-              <a:t>) e o batch (Lote) conversam?</a:t>
-            </a:r>
-          </a:p>
-          <a:p>
-            <a:pPr marL="914400" lvl="1" indent="-457200" algn="l">
-              <a:buAutoNum type="arabicPeriod"/>
-            </a:pPr>
-            <a:r>
-              <a:rPr lang="pt-PT" b="1" dirty="0"/>
-              <a:t>O Estado: </a:t>
-            </a:r>
-            <a:r>
-              <a:rPr lang="pt-PT" dirty="0"/>
-              <a:t>O streaming usa uma tabela no Postgres como “memória”, para saber a posição anterior do ônibus e calcular a velocidade.</a:t>
-            </a:r>
-          </a:p>
-          <a:p>
-            <a:pPr marL="914400" lvl="1" indent="-457200" algn="l">
-              <a:buAutoNum type="arabicPeriod"/>
-            </a:pPr>
-            <a:endParaRPr lang="pt-PT" dirty="0"/>
-          </a:p>
-          <a:p>
-            <a:pPr lvl="1" algn="l"/>
-            <a:r>
-              <a:rPr lang="pt-PT" b="1" dirty="0"/>
-              <a:t>2. 	A Fila (Silver / Delta Lake): </a:t>
-            </a:r>
-            <a:r>
-              <a:rPr lang="pt-PT" dirty="0"/>
-              <a:t>Após calcular os KPIs, o streaming faz duas coisas:</a:t>
-            </a:r>
-          </a:p>
-          <a:p>
-            <a:pPr lvl="1" algn="l"/>
-            <a:r>
-              <a:rPr lang="pt-PT" dirty="0"/>
-              <a:t>	</a:t>
-            </a:r>
-            <a:r>
-              <a:rPr lang="pt-PT" b="1" dirty="0"/>
-              <a:t>a) Entrega NRT: </a:t>
-            </a:r>
-            <a:r>
-              <a:rPr lang="pt-PT" dirty="0"/>
-              <a:t>Escreve o resultado em tabelas do PostgreSQL para os dashboards de tempo real.</a:t>
-            </a:r>
-          </a:p>
-          <a:p>
-            <a:pPr lvl="1" algn="l"/>
-            <a:r>
-              <a:rPr lang="pt-PT" dirty="0"/>
-              <a:t>	</a:t>
-            </a:r>
-            <a:r>
-              <a:rPr lang="pt-PT" b="1" dirty="0"/>
-              <a:t>b) Entrega Histórica: </a:t>
-            </a:r>
-            <a:r>
-              <a:rPr lang="pt-PT" dirty="0"/>
-              <a:t>Escreve os mesmos KPIs em uma tabela da Camada Silver (kpis_historicos_para_processar).</a:t>
-            </a:r>
-          </a:p>
-          <a:p>
-            <a:pPr lvl="1" algn="l"/>
-            <a:endParaRPr lang="pt-PT" dirty="0"/>
-          </a:p>
-          <a:p>
-            <a:pPr lvl="1" algn="l"/>
-            <a:r>
-              <a:rPr lang="pt-PT" b="1" dirty="0"/>
-              <a:t>3. 	A Consolidação (Batch): </a:t>
-            </a:r>
-            <a:r>
-              <a:rPr lang="pt-PT" dirty="0"/>
-              <a:t>O pipeline de lote (Airflow/Spark) lê essa tabela e faz o MERGE nas tabelas fato_velocidade_linha e fato_onibus_parados_linha da Camada Gold, consolidando o histórico de forma assíncrona.</a:t>
-            </a:r>
-          </a:p>
-        </p:txBody>
-      </p:sp>
-    </p:spTree>
-    <p:extLst>
-      <p:ext uri="{BB962C8B-B14F-4D97-AF65-F5344CB8AC3E}">
-        <p14:creationId xmlns:p14="http://schemas.microsoft.com/office/powerpoint/2010/main" val="1616817245"/>
-      </p:ext>
-    </p:extLst>
-  </p:cSld>
-  <p:clrMapOvr>
-    <a:masterClrMapping/>
-  </p:clrMapOvr>
-</p:sld>
-</file>
-
-<file path=ppt/slides/slide8.xml><?xml version="1.0" encoding="utf-8"?>
+<file path=ppt/slides/slide9.xml><?xml version="1.0" encoding="utf-8"?>
 <p:sld xmlns:a="http://schemas.openxmlformats.org/drawingml/2006/main" xmlns:r="http://schemas.openxmlformats.org/officeDocument/2006/relationships" xmlns:p="http://schemas.openxmlformats.org/presentationml/2006/main">
   <p:cSld>
     <p:spTree>
@@ -3872,241 +4312,6 @@
     <p:extLst>
       <p:ext uri="{BB962C8B-B14F-4D97-AF65-F5344CB8AC3E}">
         <p14:creationId xmlns:p14="http://schemas.microsoft.com/office/powerpoint/2010/main" val="396005196"/>
-      </p:ext>
-    </p:extLst>
-  </p:cSld>
-  <p:clrMapOvr>
-    <a:masterClrMapping/>
-  </p:clrMapOvr>
-</p:sld>
-</file>
-
-<file path=ppt/slides/slide9.xml><?xml version="1.0" encoding="utf-8"?>
-<p:sld xmlns:a="http://schemas.openxmlformats.org/drawingml/2006/main" xmlns:r="http://schemas.openxmlformats.org/officeDocument/2006/relationships" xmlns:p="http://schemas.openxmlformats.org/presentationml/2006/main">
-  <p:cSld>
-    <p:spTree>
-      <p:nvGrpSpPr>
-        <p:cNvPr id="1" name="">
-          <a:extLst>
-            <a:ext uri="{FF2B5EF4-FFF2-40B4-BE49-F238E27FC236}">
-              <a16:creationId xmlns:a16="http://schemas.microsoft.com/office/drawing/2014/main" id="{5D0C3AEF-DE80-C15A-7296-A9C460D97610}"/>
-            </a:ext>
-          </a:extLst>
-        </p:cNvPr>
-        <p:cNvGrpSpPr/>
-        <p:nvPr/>
-      </p:nvGrpSpPr>
-      <p:grpSpPr>
-        <a:xfrm>
-          <a:off x="0" y="0"/>
-          <a:ext cx="0" cy="0"/>
-          <a:chOff x="0" y="0"/>
-          <a:chExt cx="0" cy="0"/>
-        </a:xfrm>
-      </p:grpSpPr>
-      <p:sp>
-        <p:nvSpPr>
-          <p:cNvPr id="2" name="Título 1">
-            <a:extLst>
-              <a:ext uri="{FF2B5EF4-FFF2-40B4-BE49-F238E27FC236}">
-                <a16:creationId xmlns:a16="http://schemas.microsoft.com/office/drawing/2014/main" id="{9784CB44-F52E-2B83-E599-92EC4D8C72C7}"/>
-              </a:ext>
-            </a:extLst>
-          </p:cNvPr>
-          <p:cNvSpPr>
-            <a:spLocks noGrp="1"/>
-          </p:cNvSpPr>
-          <p:nvPr>
-            <p:ph type="ctrTitle"/>
-          </p:nvPr>
-        </p:nvSpPr>
-        <p:spPr>
-          <a:xfrm>
-            <a:off x="640080" y="1371599"/>
-            <a:ext cx="6675120" cy="552451"/>
-          </a:xfrm>
-        </p:spPr>
-        <p:txBody>
-          <a:bodyPr>
-            <a:normAutofit/>
-          </a:bodyPr>
-          <a:lstStyle/>
-          <a:p>
-            <a:r>
-              <a:rPr lang="pt-PT" sz="2800" dirty="0"/>
-              <a:t>Conclusão e Próximos Passos</a:t>
-            </a:r>
-          </a:p>
-        </p:txBody>
-      </p:sp>
-      <p:sp>
-        <p:nvSpPr>
-          <p:cNvPr id="3" name="Subtítulo 2">
-            <a:extLst>
-              <a:ext uri="{FF2B5EF4-FFF2-40B4-BE49-F238E27FC236}">
-                <a16:creationId xmlns:a16="http://schemas.microsoft.com/office/drawing/2014/main" id="{978F12B3-9065-B2EC-A2C5-64BC95007FEF}"/>
-              </a:ext>
-            </a:extLst>
-          </p:cNvPr>
-          <p:cNvSpPr>
-            <a:spLocks noGrp="1"/>
-          </p:cNvSpPr>
-          <p:nvPr>
-            <p:ph type="subTitle" idx="1"/>
-          </p:nvPr>
-        </p:nvSpPr>
-        <p:spPr>
-          <a:xfrm>
-            <a:off x="640080" y="2404871"/>
-            <a:ext cx="11301984" cy="4059937"/>
-          </a:xfrm>
-        </p:spPr>
-        <p:txBody>
-          <a:bodyPr anchor="t">
-            <a:normAutofit fontScale="85000" lnSpcReduction="20000"/>
-          </a:bodyPr>
-          <a:lstStyle/>
-          <a:p>
-            <a:pPr marL="285750" indent="-285750">
-              <a:buFont typeface="Arial" panose="020B0604020202020204" pitchFamily="34" charset="0"/>
-              <a:buChar char="•"/>
-            </a:pPr>
-            <a:r>
-              <a:rPr lang="pt-PT" dirty="0"/>
-              <a:t>O que foi entregue:</a:t>
-            </a:r>
-          </a:p>
-          <a:p>
-            <a:pPr marL="742950" lvl="1" indent="-285750" algn="l">
-              <a:buFont typeface="Arial" panose="020B0604020202020204" pitchFamily="34" charset="0"/>
-              <a:buChar char="•"/>
-            </a:pPr>
-            <a:r>
-              <a:rPr lang="pt-PT" b="1" dirty="0"/>
-              <a:t>Uma plataforma de dados ponta-a-ponta.</a:t>
-            </a:r>
-          </a:p>
-          <a:p>
-            <a:pPr marL="742950" lvl="1" indent="-285750" algn="l">
-              <a:buFont typeface="Arial" panose="020B0604020202020204" pitchFamily="34" charset="0"/>
-              <a:buChar char="•"/>
-            </a:pPr>
-            <a:r>
-              <a:rPr lang="pt-PT" b="1" dirty="0"/>
-              <a:t>Dashboards históricos (Bach) e operacionais (NRT) funcionais.</a:t>
-            </a:r>
-          </a:p>
-          <a:p>
-            <a:pPr marL="742950" lvl="1" indent="-285750" algn="l">
-              <a:buFont typeface="Arial" panose="020B0604020202020204" pitchFamily="34" charset="0"/>
-              <a:buChar char="•"/>
-            </a:pPr>
-            <a:r>
-              <a:rPr lang="pt-PT" b="1" dirty="0"/>
-              <a:t>Uma "fonte da verdade" (Gold Lakehouse) confiável e escalável.</a:t>
-            </a:r>
-          </a:p>
-          <a:p>
-            <a:pPr marL="285750" indent="-285750">
-              <a:buFont typeface="Arial" panose="020B0604020202020204" pitchFamily="34" charset="0"/>
-              <a:buChar char="•"/>
-            </a:pPr>
-            <a:endParaRPr lang="pt-PT" dirty="0"/>
-          </a:p>
-          <a:p>
-            <a:pPr marL="285750" indent="-285750">
-              <a:buFont typeface="Arial" panose="020B0604020202020204" pitchFamily="34" charset="0"/>
-              <a:buChar char="•"/>
-            </a:pPr>
-            <a:r>
-              <a:rPr lang="pt-PT" dirty="0"/>
-              <a:t>Próximos Passos:</a:t>
-            </a:r>
-          </a:p>
-          <a:p>
-            <a:pPr marL="742950" lvl="1" indent="-285750" algn="l">
-              <a:buFont typeface="Arial" panose="020B0604020202020204" pitchFamily="34" charset="0"/>
-              <a:buChar char="•"/>
-            </a:pPr>
-            <a:r>
-              <a:rPr lang="pt-PT" b="1" dirty="0"/>
-              <a:t>Enriquecer a camada Gold: </a:t>
-            </a:r>
-            <a:r>
-              <a:rPr lang="pt-PT" dirty="0"/>
-              <a:t>mais KPIs e informações.</a:t>
-            </a:r>
-          </a:p>
-          <a:p>
-            <a:pPr marL="742950" lvl="1" indent="-285750" algn="l">
-              <a:buFont typeface="Arial" panose="020B0604020202020204" pitchFamily="34" charset="0"/>
-              <a:buChar char="•"/>
-            </a:pPr>
-            <a:r>
-              <a:rPr lang="pt-PT" b="1" dirty="0"/>
-              <a:t>PoC para Cloud: </a:t>
-            </a:r>
-            <a:r>
-              <a:rPr lang="pt-PT" dirty="0"/>
-              <a:t>migração para AWS, </a:t>
-            </a:r>
-            <a:r>
-              <a:rPr lang="pt-PT" dirty="0" err="1"/>
-              <a:t>Azure</a:t>
-            </a:r>
-            <a:r>
-              <a:rPr lang="pt-PT" dirty="0"/>
-              <a:t> ou GCP.</a:t>
-            </a:r>
-          </a:p>
-          <a:p>
-            <a:pPr marL="742950" lvl="1" indent="-285750" algn="l">
-              <a:buFont typeface="Arial" panose="020B0604020202020204" pitchFamily="34" charset="0"/>
-              <a:buChar char="•"/>
-            </a:pPr>
-            <a:r>
-              <a:rPr lang="pt-PT" b="1" dirty="0"/>
-              <a:t>Alertas: </a:t>
-            </a:r>
-            <a:r>
-              <a:rPr lang="pt-PT" dirty="0"/>
-              <a:t>Criar alertas automáticos (Ex: "Linha 8000 está com velocidade abaixo de 5km/h há 10 minutos").</a:t>
-            </a:r>
-          </a:p>
-          <a:p>
-            <a:pPr marL="742950" lvl="1" indent="-285750" algn="l">
-              <a:buFont typeface="Arial" panose="020B0604020202020204" pitchFamily="34" charset="0"/>
-              <a:buChar char="•"/>
-            </a:pPr>
-            <a:r>
-              <a:rPr lang="pt-PT" b="1" dirty="0"/>
-              <a:t>Machine Learning: </a:t>
-            </a:r>
-            <a:r>
-              <a:rPr lang="pt-PT" dirty="0"/>
-              <a:t>Usar o histórico gerado de velocidade e posições para treinar modelos de previsão de chegada (ETA).</a:t>
-            </a:r>
-          </a:p>
-          <a:p>
-            <a:pPr marL="742950" lvl="1" indent="-285750" algn="l">
-              <a:buFont typeface="Arial" panose="020B0604020202020204" pitchFamily="34" charset="0"/>
-              <a:buChar char="•"/>
-            </a:pPr>
-            <a:r>
-              <a:rPr lang="pt-PT" b="1" dirty="0"/>
-              <a:t>Novos Dashboards: </a:t>
-            </a:r>
-            <a:r>
-              <a:rPr lang="pt-PT" dirty="0"/>
-              <a:t>Análise de performance por concessionária, por período do dia, etc.</a:t>
-            </a:r>
-          </a:p>
-        </p:txBody>
-      </p:sp>
-    </p:spTree>
-    <p:extLst>
-      <p:ext uri="{BB962C8B-B14F-4D97-AF65-F5344CB8AC3E}">
-        <p14:creationId xmlns:p14="http://schemas.microsoft.com/office/powerpoint/2010/main" val="3686714567"/>
       </p:ext>
     </p:extLst>
   </p:cSld>

</xml_diff>

<commit_message>
- Ajustes na documentação.
</commit_message>
<xml_diff>
--- a/documentacoes/Apresentação_Projeto_Final.pptx
+++ b/documentacoes/Apresentação_Projeto_Final.pptx
@@ -7,15 +7,16 @@
   <p:sldIdLst>
     <p:sldId id="256" r:id="rId2"/>
     <p:sldId id="257" r:id="rId3"/>
-    <p:sldId id="258" r:id="rId4"/>
-    <p:sldId id="260" r:id="rId5"/>
+    <p:sldId id="267" r:id="rId4"/>
+    <p:sldId id="258" r:id="rId5"/>
     <p:sldId id="266" r:id="rId6"/>
-    <p:sldId id="259" r:id="rId7"/>
-    <p:sldId id="264" r:id="rId8"/>
-    <p:sldId id="265" r:id="rId9"/>
-    <p:sldId id="261" r:id="rId10"/>
-    <p:sldId id="262" r:id="rId11"/>
-    <p:sldId id="263" r:id="rId12"/>
+    <p:sldId id="260" r:id="rId7"/>
+    <p:sldId id="259" r:id="rId8"/>
+    <p:sldId id="264" r:id="rId9"/>
+    <p:sldId id="265" r:id="rId10"/>
+    <p:sldId id="261" r:id="rId11"/>
+    <p:sldId id="262" r:id="rId12"/>
+    <p:sldId id="263" r:id="rId13"/>
   </p:sldIdLst>
   <p:sldSz cx="12192000" cy="6858000"/>
   <p:notesSz cx="6858000" cy="9144000"/>
@@ -976,7 +977,7 @@
       </p:grpSpPr>
       <p:sp useBgFill="1">
         <p:nvSpPr>
-          <p:cNvPr id="23" name="Rectangle 22">
+          <p:cNvPr id="2063" name="Rectangle 2062">
             <a:extLst>
               <a:ext uri="{FF2B5EF4-FFF2-40B4-BE49-F238E27FC236}">
                 <a16:creationId xmlns:a16="http://schemas.microsoft.com/office/drawing/2014/main" id="{19F9BF86-FE94-4517-B97D-026C7515E589}"/>
@@ -1068,13 +1069,13 @@
         </p:nvSpPr>
         <p:spPr>
           <a:xfrm>
-            <a:off x="7535756" y="639311"/>
-            <a:ext cx="4308672" cy="2037482"/>
+            <a:off x="7537528" y="1032764"/>
+            <a:ext cx="4308672" cy="3224045"/>
           </a:xfrm>
         </p:spPr>
         <p:txBody>
           <a:bodyPr anchor="b">
-            <a:normAutofit fontScale="90000"/>
+            <a:normAutofit/>
           </a:bodyPr>
           <a:lstStyle/>
           <a:p>
@@ -1084,10 +1085,10 @@
               </a:lnSpc>
             </a:pPr>
             <a:r>
-              <a:rPr lang="pt-BR" sz="4900" dirty="0"/>
+              <a:rPr lang="pt-BR" sz="4900"/>
               <a:t>Monitoramento da Frota de Ônibus de SP</a:t>
             </a:r>
-            <a:endParaRPr lang="pt-PT" sz="4900" dirty="0"/>
+            <a:endParaRPr lang="pt-PT" sz="4900"/>
           </a:p>
         </p:txBody>
       </p:sp>
@@ -1109,8 +1110,8 @@
         </p:nvSpPr>
         <p:spPr>
           <a:xfrm>
-            <a:off x="7535756" y="5046281"/>
-            <a:ext cx="4308672" cy="1172408"/>
+            <a:off x="7537528" y="5289573"/>
+            <a:ext cx="4308672" cy="935419"/>
           </a:xfrm>
         </p:spPr>
         <p:txBody>
@@ -1126,7 +1127,7 @@
             </a:pPr>
             <a:r>
               <a:rPr lang="pt-BR" sz="1500" dirty="0"/>
-              <a:t>Uma arquitetura Híbrida Batch/Streaming para Análise histórica e Operacional da frota da SPTrans</a:t>
+              <a:t>Uma arquitetura para Análise histórica e Operacional da frota da SPTrans</a:t>
             </a:r>
             <a:endParaRPr lang="pt-PT" sz="1500" dirty="0"/>
           </a:p>
@@ -1134,10 +1135,10 @@
       </p:sp>
       <p:pic>
         <p:nvPicPr>
-          <p:cNvPr id="4" name="Picture 3">
-            <a:extLst>
-              <a:ext uri="{FF2B5EF4-FFF2-40B4-BE49-F238E27FC236}">
-                <a16:creationId xmlns:a16="http://schemas.microsoft.com/office/drawing/2014/main" id="{748DCE07-086F-78D2-B051-F9CF5902F90A}"/>
+          <p:cNvPr id="2059" name="Picture 2058" descr="Ônibus em movimento">
+            <a:extLst>
+              <a:ext uri="{FF2B5EF4-FFF2-40B4-BE49-F238E27FC236}">
+                <a16:creationId xmlns:a16="http://schemas.microsoft.com/office/drawing/2014/main" id="{6E65909B-7F74-F431-EB8A-58E9A5792C1D}"/>
               </a:ext>
             </a:extLst>
           </p:cNvPr>
@@ -1148,7 +1149,7 @@
         </p:nvPicPr>
         <p:blipFill>
           <a:blip r:embed="rId2"/>
-          <a:srcRect l="13803" r="10397"/>
+          <a:srcRect l="29844" r="2693" b="-1"/>
           <a:stretch>
             <a:fillRect/>
           </a:stretch>
@@ -1165,7 +1166,7 @@
       </p:pic>
       <p:cxnSp>
         <p:nvCxnSpPr>
-          <p:cNvPr id="25" name="Straight Connector 24">
+          <p:cNvPr id="2065" name="Straight Connector 2064">
             <a:extLst>
               <a:ext uri="{FF2B5EF4-FFF2-40B4-BE49-F238E27FC236}">
                 <a16:creationId xmlns:a16="http://schemas.microsoft.com/office/drawing/2014/main" id="{6CA391F1-4B2C-521B-F6A5-52C74B30349D}"/>
@@ -1371,6 +1372,155 @@
         <p:cNvPr id="1" name="">
           <a:extLst>
             <a:ext uri="{FF2B5EF4-FFF2-40B4-BE49-F238E27FC236}">
+              <a16:creationId xmlns:a16="http://schemas.microsoft.com/office/drawing/2014/main" id="{FB5E3759-BB3A-3F7E-3468-5FAEF11FE0C4}"/>
+            </a:ext>
+          </a:extLst>
+        </p:cNvPr>
+        <p:cNvGrpSpPr/>
+        <p:nvPr/>
+      </p:nvGrpSpPr>
+      <p:grpSpPr>
+        <a:xfrm>
+          <a:off x="0" y="0"/>
+          <a:ext cx="0" cy="0"/>
+          <a:chOff x="0" y="0"/>
+          <a:chExt cx="0" cy="0"/>
+        </a:xfrm>
+      </p:grpSpPr>
+      <p:sp>
+        <p:nvSpPr>
+          <p:cNvPr id="2" name="Título 1">
+            <a:extLst>
+              <a:ext uri="{FF2B5EF4-FFF2-40B4-BE49-F238E27FC236}">
+                <a16:creationId xmlns:a16="http://schemas.microsoft.com/office/drawing/2014/main" id="{E0DCB332-670C-E332-1D2D-AA8945DEE611}"/>
+              </a:ext>
+            </a:extLst>
+          </p:cNvPr>
+          <p:cNvSpPr>
+            <a:spLocks noGrp="1"/>
+          </p:cNvSpPr>
+          <p:nvPr>
+            <p:ph type="ctrTitle"/>
+          </p:nvPr>
+        </p:nvSpPr>
+        <p:spPr>
+          <a:xfrm>
+            <a:off x="640080" y="1371599"/>
+            <a:ext cx="6675120" cy="552451"/>
+          </a:xfrm>
+        </p:spPr>
+        <p:txBody>
+          <a:bodyPr>
+            <a:normAutofit/>
+          </a:bodyPr>
+          <a:lstStyle/>
+          <a:p>
+            <a:r>
+              <a:rPr lang="pt-PT" sz="2800" dirty="0"/>
+              <a:t>Demonstração – Pipeline em Ação</a:t>
+            </a:r>
+          </a:p>
+        </p:txBody>
+      </p:sp>
+      <p:sp>
+        <p:nvSpPr>
+          <p:cNvPr id="3" name="Subtítulo 2">
+            <a:extLst>
+              <a:ext uri="{FF2B5EF4-FFF2-40B4-BE49-F238E27FC236}">
+                <a16:creationId xmlns:a16="http://schemas.microsoft.com/office/drawing/2014/main" id="{FA356A1B-E9BF-9F0A-E988-EDFD96B04B38}"/>
+              </a:ext>
+            </a:extLst>
+          </p:cNvPr>
+          <p:cNvSpPr>
+            <a:spLocks noGrp="1"/>
+          </p:cNvSpPr>
+          <p:nvPr>
+            <p:ph type="subTitle" idx="1"/>
+          </p:nvPr>
+        </p:nvSpPr>
+        <p:spPr>
+          <a:xfrm>
+            <a:off x="640080" y="2404871"/>
+            <a:ext cx="11301984" cy="2221993"/>
+          </a:xfrm>
+        </p:spPr>
+        <p:txBody>
+          <a:bodyPr anchor="t">
+            <a:normAutofit/>
+          </a:bodyPr>
+          <a:lstStyle/>
+          <a:p>
+            <a:pPr marL="285750" indent="-285750">
+              <a:buFont typeface="Arial" panose="020B0604020202020204" pitchFamily="34" charset="0"/>
+              <a:buChar char="•"/>
+            </a:pPr>
+            <a:r>
+              <a:rPr lang="pt-BR" dirty="0"/>
+              <a:t>Dashboards no metabase</a:t>
+            </a:r>
+            <a:endParaRPr lang="pt-PT" dirty="0"/>
+          </a:p>
+          <a:p>
+            <a:pPr marL="742950" lvl="1" indent="-285750" algn="l">
+              <a:buFont typeface="Arial" panose="020B0604020202020204" pitchFamily="34" charset="0"/>
+              <a:buChar char="•"/>
+            </a:pPr>
+            <a:r>
+              <a:rPr lang="pt-PT" dirty="0"/>
+              <a:t>Near real time.</a:t>
+            </a:r>
+          </a:p>
+          <a:p>
+            <a:pPr marL="742950" lvl="1" indent="-285750" algn="l">
+              <a:buFont typeface="Arial" panose="020B0604020202020204" pitchFamily="34" charset="0"/>
+              <a:buChar char="•"/>
+            </a:pPr>
+            <a:r>
+              <a:rPr lang="pt-PT" dirty="0"/>
+              <a:t>Análise histórica.</a:t>
+            </a:r>
+          </a:p>
+          <a:p>
+            <a:pPr marL="742950" lvl="1" indent="-285750" algn="l">
+              <a:buFont typeface="Arial" panose="020B0604020202020204" pitchFamily="34" charset="0"/>
+              <a:buChar char="•"/>
+            </a:pPr>
+            <a:endParaRPr lang="pt-PT" dirty="0"/>
+          </a:p>
+          <a:p>
+            <a:pPr marL="285750" indent="-285750">
+              <a:buFont typeface="Arial" panose="020B0604020202020204" pitchFamily="34" charset="0"/>
+              <a:buChar char="•"/>
+            </a:pPr>
+            <a:r>
+              <a:rPr lang="pt-BR" dirty="0"/>
+              <a:t>Processamento dos micro-lotes com Spark streaming </a:t>
+            </a:r>
+            <a:endParaRPr lang="pt-PT" dirty="0"/>
+          </a:p>
+        </p:txBody>
+      </p:sp>
+    </p:spTree>
+    <p:extLst>
+      <p:ext uri="{BB962C8B-B14F-4D97-AF65-F5344CB8AC3E}">
+        <p14:creationId xmlns:p14="http://schemas.microsoft.com/office/powerpoint/2010/main" val="396005196"/>
+      </p:ext>
+    </p:extLst>
+  </p:cSld>
+  <p:clrMapOvr>
+    <a:masterClrMapping/>
+  </p:clrMapOvr>
+</p:sld>
+</file>
+
+<file path=ppt/slides/slide11.xml><?xml version="1.0" encoding="utf-8"?>
+<p:sld xmlns:a="http://schemas.openxmlformats.org/drawingml/2006/main" xmlns:r="http://schemas.openxmlformats.org/officeDocument/2006/relationships" xmlns:p="http://schemas.openxmlformats.org/presentationml/2006/main">
+  <p:cSld>
+    <p:spTree>
+      <p:nvGrpSpPr>
+        <p:cNvPr id="1" name="">
+          <a:extLst>
+            <a:ext uri="{FF2B5EF4-FFF2-40B4-BE49-F238E27FC236}">
               <a16:creationId xmlns:a16="http://schemas.microsoft.com/office/drawing/2014/main" id="{5D0C3AEF-DE80-C15A-7296-A9C460D97610}"/>
             </a:ext>
           </a:extLst>
@@ -1445,7 +1595,7 @@
         </p:spPr>
         <p:txBody>
           <a:bodyPr anchor="t">
-            <a:normAutofit fontScale="85000" lnSpcReduction="20000"/>
+            <a:normAutofit fontScale="77500" lnSpcReduction="20000"/>
           </a:bodyPr>
           <a:lstStyle/>
           <a:p>
@@ -1455,7 +1605,7 @@
             </a:pPr>
             <a:r>
               <a:rPr lang="pt-PT" dirty="0"/>
-              <a:t>O que foi entregue:</a:t>
+              <a:t>O que foi entregue?</a:t>
             </a:r>
           </a:p>
           <a:p>
@@ -1489,7 +1639,17 @@
             </a:r>
           </a:p>
           <a:p>
-            <a:pPr marL="285750" indent="-285750">
+            <a:pPr marL="742950" lvl="1" indent="-285750" algn="l">
+              <a:buFont typeface="Arial" panose="020B0604020202020204" pitchFamily="34" charset="0"/>
+              <a:buChar char="•"/>
+            </a:pPr>
+            <a:r>
+              <a:rPr lang="pt-PT" b="1" dirty="0"/>
+              <a:t>Dados acessíveis de forma federada.</a:t>
+            </a:r>
+          </a:p>
+          <a:p>
+            <a:pPr marL="742950" lvl="1" indent="-285750" algn="l">
               <a:buFont typeface="Arial" panose="020B0604020202020204" pitchFamily="34" charset="0"/>
               <a:buChar char="•"/>
             </a:pPr>
@@ -1516,7 +1676,7 @@
             </a:r>
             <a:r>
               <a:rPr lang="pt-PT" dirty="0"/>
-              <a:t>mais KPIs e informações.</a:t>
+              <a:t>novos KPIs e informações.</a:t>
             </a:r>
           </a:p>
           <a:p>
@@ -1598,7 +1758,7 @@
 </p:sld>
 </file>
 
-<file path=ppt/slides/slide11.xml><?xml version="1.0" encoding="utf-8"?>
+<file path=ppt/slides/slide12.xml><?xml version="1.0" encoding="utf-8"?>
 <p:sld xmlns:a="http://schemas.openxmlformats.org/drawingml/2006/main" xmlns:r="http://schemas.openxmlformats.org/officeDocument/2006/relationships" xmlns:p="http://schemas.openxmlformats.org/presentationml/2006/main">
   <p:cSld>
     <p:spTree>
@@ -1650,49 +1810,59 @@
           <a:lstStyle/>
           <a:p>
             <a:r>
-              <a:rPr lang="pt-PT" sz="2800"/>
+              <a:rPr lang="pt-PT" sz="2800" dirty="0"/>
               <a:t>Perguntas</a:t>
             </a:r>
-            <a:endParaRPr lang="pt-PT" sz="2800" dirty="0"/>
           </a:p>
         </p:txBody>
       </p:sp>
-      <p:sp>
-        <p:nvSpPr>
-          <p:cNvPr id="3" name="Subtítulo 2">
-            <a:extLst>
-              <a:ext uri="{FF2B5EF4-FFF2-40B4-BE49-F238E27FC236}">
-                <a16:creationId xmlns:a16="http://schemas.microsoft.com/office/drawing/2014/main" id="{EC9088C0-6136-E2CD-4A0E-C50FB5B1B84C}"/>
-              </a:ext>
-            </a:extLst>
-          </p:cNvPr>
-          <p:cNvSpPr>
-            <a:spLocks noGrp="1"/>
-          </p:cNvSpPr>
-          <p:nvPr>
-            <p:ph type="subTitle" idx="1"/>
-          </p:nvPr>
-        </p:nvSpPr>
-        <p:spPr>
+      <p:pic>
+        <p:nvPicPr>
+          <p:cNvPr id="1028" name="Picture 4" descr="Ponto de interrogação - ícones de logotipo grátis">
+            <a:extLst>
+              <a:ext uri="{FF2B5EF4-FFF2-40B4-BE49-F238E27FC236}">
+                <a16:creationId xmlns:a16="http://schemas.microsoft.com/office/drawing/2014/main" id="{E57EC2C1-BD48-8D2F-78FA-71D737066F70}"/>
+              </a:ext>
+            </a:extLst>
+          </p:cNvPr>
+          <p:cNvPicPr>
+            <a:picLocks noChangeAspect="1" noChangeArrowheads="1"/>
+          </p:cNvPicPr>
+          <p:nvPr/>
+        </p:nvPicPr>
+        <p:blipFill>
+          <a:blip r:embed="rId2">
+            <a:extLst>
+              <a:ext uri="{28A0092B-C50C-407E-A947-70E740481C1C}">
+                <a14:useLocalDpi xmlns:a14="http://schemas.microsoft.com/office/drawing/2010/main" val="0"/>
+              </a:ext>
+            </a:extLst>
+          </a:blip>
+          <a:srcRect/>
+          <a:stretch>
+            <a:fillRect/>
+          </a:stretch>
+        </p:blipFill>
+        <p:spPr bwMode="auto">
           <a:xfrm>
-            <a:off x="640080" y="2404871"/>
-            <a:ext cx="11301984" cy="4059937"/>
+            <a:off x="4367212" y="2028826"/>
+            <a:ext cx="3457575" cy="3457575"/>
           </a:xfrm>
+          <a:prstGeom prst="rect">
+            <a:avLst/>
+          </a:prstGeom>
+          <a:noFill/>
+          <a:extLst>
+            <a:ext uri="{909E8E84-426E-40DD-AFC4-6F175D3DCCD1}">
+              <a14:hiddenFill xmlns:a14="http://schemas.microsoft.com/office/drawing/2010/main">
+                <a:solidFill>
+                  <a:srgbClr val="FFFFFF"/>
+                </a:solidFill>
+              </a14:hiddenFill>
+            </a:ext>
+          </a:extLst>
         </p:spPr>
-        <p:txBody>
-          <a:bodyPr anchor="t">
-            <a:normAutofit/>
-          </a:bodyPr>
-          <a:lstStyle/>
-          <a:p>
-            <a:pPr marL="285750" indent="-285750">
-              <a:buFont typeface="Arial" panose="020B0604020202020204" pitchFamily="34" charset="0"/>
-              <a:buChar char="•"/>
-            </a:pPr>
-            <a:endParaRPr lang="pt-PT" dirty="0"/>
-          </a:p>
-        </p:txBody>
-      </p:sp>
+      </p:pic>
     </p:spTree>
     <p:extLst>
       <p:ext uri="{BB962C8B-B14F-4D97-AF65-F5344CB8AC3E}">
@@ -1776,13 +1946,13 @@
         </p:nvSpPr>
         <p:spPr>
           <a:xfrm>
-            <a:off x="640080" y="2404871"/>
-            <a:ext cx="11301984" cy="4059937"/>
+            <a:off x="640080" y="2103121"/>
+            <a:ext cx="11301984" cy="4361688"/>
           </a:xfrm>
         </p:spPr>
         <p:txBody>
           <a:bodyPr anchor="t">
-            <a:normAutofit fontScale="85000" lnSpcReduction="20000"/>
+            <a:normAutofit fontScale="70000" lnSpcReduction="20000"/>
           </a:bodyPr>
           <a:lstStyle/>
           <a:p>
@@ -1830,7 +2000,7 @@
             </a:r>
           </a:p>
           <a:p>
-            <a:pPr marL="285750" indent="-285750">
+            <a:pPr marL="742950" lvl="1" indent="-285750" algn="l">
               <a:buFont typeface="Arial" panose="020B0604020202020204" pitchFamily="34" charset="0"/>
               <a:buChar char="•"/>
             </a:pPr>
@@ -1842,8 +2012,54 @@
               <a:buChar char="•"/>
             </a:pPr>
             <a:r>
-              <a:rPr lang="pt-PT" dirty="0"/>
-              <a:t>Visão Histórica (Batch): "Qual foi o pico de ônibus em operação no período da manhã?" ou “Qual o percentual da frota congestionada nas últimas horas?"</a:t>
+              <a:rPr lang="pt-PT" dirty="0">
+                <a:solidFill>
+                  <a:srgbClr val="0070C0"/>
+                </a:solidFill>
+              </a:rPr>
+              <a:t>Visão NRT (Near Real-Time): </a:t>
+            </a:r>
+          </a:p>
+          <a:p>
+            <a:pPr marL="1200150" lvl="2" indent="-285750" algn="l">
+              <a:buFont typeface="Arial" panose="020B0604020202020204" pitchFamily="34" charset="0"/>
+              <a:buChar char="•"/>
+            </a:pPr>
+            <a:r>
+              <a:rPr lang="pt-PT" dirty="0">
+                <a:solidFill>
+                  <a:srgbClr val="0070C0"/>
+                </a:solidFill>
+              </a:rPr>
+              <a:t>Quantos ônibus em congestionamento agora?"</a:t>
+            </a:r>
+          </a:p>
+          <a:p>
+            <a:pPr marL="1200150" lvl="2" indent="-285750" algn="l">
+              <a:buFont typeface="Arial" panose="020B0604020202020204" pitchFamily="34" charset="0"/>
+              <a:buChar char="•"/>
+            </a:pPr>
+            <a:r>
+              <a:rPr lang="pt-PT" dirty="0">
+                <a:solidFill>
+                  <a:srgbClr val="0070C0"/>
+                </a:solidFill>
+              </a:rPr>
+              <a:t>Quais são as linhas mais lentas? </a:t>
+            </a:r>
+          </a:p>
+          <a:p>
+            <a:pPr marL="1200150" lvl="2" indent="-285750" algn="l">
+              <a:buFont typeface="Arial" panose="020B0604020202020204" pitchFamily="34" charset="0"/>
+              <a:buChar char="•"/>
+            </a:pPr>
+            <a:r>
+              <a:rPr lang="pt-PT" dirty="0">
+                <a:solidFill>
+                  <a:srgbClr val="0070C0"/>
+                </a:solidFill>
+              </a:rPr>
+              <a:t>Quais linhas estão enfrentando congestionamento agora?</a:t>
             </a:r>
           </a:p>
           <a:p>
@@ -1859,8 +2075,40 @@
               <a:buChar char="•"/>
             </a:pPr>
             <a:r>
-              <a:rPr lang="pt-PT" dirty="0"/>
-              <a:t>Visão NRT (Near Real-Time): “Quantos ônibus em congestionamento agora?" ou “Quais são as linhas mais lentas?” ou “Quais linhas estão enfrentando congestionamento agora?”</a:t>
+              <a:rPr lang="pt-PT" dirty="0">
+                <a:solidFill>
+                  <a:srgbClr val="0070C0"/>
+                </a:solidFill>
+              </a:rPr>
+              <a:t>Visão Histórica (Batch): </a:t>
+            </a:r>
+          </a:p>
+          <a:p>
+            <a:pPr marL="1200150" lvl="2" indent="-285750" algn="l">
+              <a:buFont typeface="Arial" panose="020B0604020202020204" pitchFamily="34" charset="0"/>
+              <a:buChar char="•"/>
+            </a:pPr>
+            <a:r>
+              <a:rPr lang="pt-PT" dirty="0">
+                <a:solidFill>
+                  <a:srgbClr val="0070C0"/>
+                </a:solidFill>
+              </a:rPr>
+              <a:t>Qual foi o pico de ônibus em operação no período da manhã?</a:t>
+            </a:r>
+          </a:p>
+          <a:p>
+            <a:pPr marL="1200150" lvl="2" indent="-285750" algn="l">
+              <a:buFont typeface="Arial" panose="020B0604020202020204" pitchFamily="34" charset="0"/>
+              <a:buChar char="•"/>
+            </a:pPr>
+            <a:r>
+              <a:rPr lang="pt-PT" dirty="0">
+                <a:solidFill>
+                  <a:srgbClr val="0070C0"/>
+                </a:solidFill>
+              </a:rPr>
+              <a:t>Qual o percentual da frota congestionada nas últimas horas?</a:t>
             </a:r>
           </a:p>
         </p:txBody>
@@ -1879,6 +2127,175 @@
 </file>
 
 <file path=ppt/slides/slide3.xml><?xml version="1.0" encoding="utf-8"?>
+<p:sld xmlns:a="http://schemas.openxmlformats.org/drawingml/2006/main" xmlns:r="http://schemas.openxmlformats.org/officeDocument/2006/relationships" xmlns:p="http://schemas.openxmlformats.org/presentationml/2006/main">
+  <p:cSld>
+    <p:spTree>
+      <p:nvGrpSpPr>
+        <p:cNvPr id="1" name="">
+          <a:extLst>
+            <a:ext uri="{FF2B5EF4-FFF2-40B4-BE49-F238E27FC236}">
+              <a16:creationId xmlns:a16="http://schemas.microsoft.com/office/drawing/2014/main" id="{010930CE-7239-F738-1C85-B22F7CDE55F5}"/>
+            </a:ext>
+          </a:extLst>
+        </p:cNvPr>
+        <p:cNvGrpSpPr/>
+        <p:nvPr/>
+      </p:nvGrpSpPr>
+      <p:grpSpPr>
+        <a:xfrm>
+          <a:off x="0" y="0"/>
+          <a:ext cx="0" cy="0"/>
+          <a:chOff x="0" y="0"/>
+          <a:chExt cx="0" cy="0"/>
+        </a:xfrm>
+      </p:grpSpPr>
+      <p:sp>
+        <p:nvSpPr>
+          <p:cNvPr id="2" name="Título 1">
+            <a:extLst>
+              <a:ext uri="{FF2B5EF4-FFF2-40B4-BE49-F238E27FC236}">
+                <a16:creationId xmlns:a16="http://schemas.microsoft.com/office/drawing/2014/main" id="{4C7F89B4-A10D-5C18-2A9E-6A55461087FD}"/>
+              </a:ext>
+            </a:extLst>
+          </p:cNvPr>
+          <p:cNvSpPr>
+            <a:spLocks noGrp="1"/>
+          </p:cNvSpPr>
+          <p:nvPr>
+            <p:ph type="ctrTitle"/>
+          </p:nvPr>
+        </p:nvSpPr>
+        <p:spPr>
+          <a:xfrm>
+            <a:off x="640080" y="1371599"/>
+            <a:ext cx="6675120" cy="552451"/>
+          </a:xfrm>
+        </p:spPr>
+        <p:txBody>
+          <a:bodyPr>
+            <a:normAutofit/>
+          </a:bodyPr>
+          <a:lstStyle/>
+          <a:p>
+            <a:r>
+              <a:rPr lang="pt-PT" sz="2800" dirty="0"/>
+              <a:t>Premissas para a Proposta de Solução</a:t>
+            </a:r>
+          </a:p>
+        </p:txBody>
+      </p:sp>
+      <p:sp>
+        <p:nvSpPr>
+          <p:cNvPr id="3" name="Subtítulo 2">
+            <a:extLst>
+              <a:ext uri="{FF2B5EF4-FFF2-40B4-BE49-F238E27FC236}">
+                <a16:creationId xmlns:a16="http://schemas.microsoft.com/office/drawing/2014/main" id="{EDCFE901-0115-CF62-EDA0-06B8F86A59E3}"/>
+              </a:ext>
+            </a:extLst>
+          </p:cNvPr>
+          <p:cNvSpPr>
+            <a:spLocks noGrp="1"/>
+          </p:cNvSpPr>
+          <p:nvPr>
+            <p:ph type="subTitle" idx="1"/>
+          </p:nvPr>
+        </p:nvSpPr>
+        <p:spPr>
+          <a:xfrm>
+            <a:off x="640080" y="2679191"/>
+            <a:ext cx="11301984" cy="3026665"/>
+          </a:xfrm>
+        </p:spPr>
+        <p:txBody>
+          <a:bodyPr anchor="t">
+            <a:normAutofit lnSpcReduction="10000"/>
+          </a:bodyPr>
+          <a:lstStyle/>
+          <a:p>
+            <a:pPr marL="285750" indent="-285750">
+              <a:buFont typeface="Arial" panose="020B0604020202020204" pitchFamily="34" charset="0"/>
+              <a:buChar char="•"/>
+            </a:pPr>
+            <a:r>
+              <a:rPr lang="pt-PT" sz="1600" dirty="0"/>
+              <a:t>Utilizar tecnologias aprendidas no curso – stack moderna e open-</a:t>
+            </a:r>
+            <a:r>
+              <a:rPr lang="pt-PT" sz="1600" dirty="0" err="1"/>
+              <a:t>source</a:t>
+            </a:r>
+            <a:r>
+              <a:rPr lang="pt-PT" sz="1600" dirty="0"/>
+              <a:t>.</a:t>
+            </a:r>
+          </a:p>
+          <a:p>
+            <a:pPr marL="285750" indent="-285750">
+              <a:buFont typeface="Arial" panose="020B0604020202020204" pitchFamily="34" charset="0"/>
+              <a:buChar char="•"/>
+            </a:pPr>
+            <a:endParaRPr lang="pt-PT" sz="1600" dirty="0"/>
+          </a:p>
+          <a:p>
+            <a:pPr marL="285750" indent="-285750">
+              <a:buFont typeface="Arial" panose="020B0604020202020204" pitchFamily="34" charset="0"/>
+              <a:buChar char="•"/>
+            </a:pPr>
+            <a:r>
+              <a:rPr lang="pt-PT" sz="1600" dirty="0"/>
+              <a:t>Infraestrutura portátil e reprodutível – Docker.</a:t>
+            </a:r>
+          </a:p>
+          <a:p>
+            <a:pPr marL="285750" indent="-285750">
+              <a:buFont typeface="Arial" panose="020B0604020202020204" pitchFamily="34" charset="0"/>
+              <a:buChar char="•"/>
+            </a:pPr>
+            <a:endParaRPr lang="pt-PT" sz="1600" dirty="0"/>
+          </a:p>
+          <a:p>
+            <a:pPr marL="285750" indent="-285750">
+              <a:buFont typeface="Arial" panose="020B0604020202020204" pitchFamily="34" charset="0"/>
+              <a:buChar char="•"/>
+            </a:pPr>
+            <a:r>
+              <a:rPr lang="pt-PT" sz="1600" dirty="0"/>
+              <a:t>Qualidade de dados via a Arquitetura medalhão.</a:t>
+            </a:r>
+          </a:p>
+          <a:p>
+            <a:pPr marL="285750" indent="-285750">
+              <a:buFont typeface="Arial" panose="020B0604020202020204" pitchFamily="34" charset="0"/>
+              <a:buChar char="•"/>
+            </a:pPr>
+            <a:endParaRPr lang="pt-PT" sz="1600" dirty="0"/>
+          </a:p>
+          <a:p>
+            <a:pPr marL="285750" indent="-285750">
+              <a:buFont typeface="Arial" panose="020B0604020202020204" pitchFamily="34" charset="0"/>
+              <a:buChar char="•"/>
+            </a:pPr>
+            <a:r>
+              <a:rPr lang="pt-PT" sz="1600" dirty="0"/>
+              <a:t>Disponibilizar os dados através de múltiplos canais de consumo.</a:t>
+            </a:r>
+          </a:p>
+        </p:txBody>
+      </p:sp>
+    </p:spTree>
+    <p:extLst>
+      <p:ext uri="{BB962C8B-B14F-4D97-AF65-F5344CB8AC3E}">
+        <p14:creationId xmlns:p14="http://schemas.microsoft.com/office/powerpoint/2010/main" val="323414062"/>
+      </p:ext>
+    </p:extLst>
+  </p:cSld>
+  <p:clrMapOvr>
+    <a:masterClrMapping/>
+  </p:clrMapOvr>
+</p:sld>
+</file>
+
+<file path=ppt/slides/slide4.xml><?xml version="1.0" encoding="utf-8"?>
 <p:sld xmlns:a="http://schemas.openxmlformats.org/drawingml/2006/main" xmlns:r="http://schemas.openxmlformats.org/officeDocument/2006/relationships" xmlns:p="http://schemas.openxmlformats.org/presentationml/2006/main">
   <p:cSld>
     <p:spTree>
@@ -1931,7 +2348,7 @@
           <a:p>
             <a:r>
               <a:rPr lang="pt-PT" sz="2800" dirty="0"/>
-              <a:t>Os Objetivos do Projeto</a:t>
+              <a:t>Objetivos do Projeto</a:t>
             </a:r>
           </a:p>
         </p:txBody>
@@ -1970,7 +2387,44 @@
             </a:pPr>
             <a:r>
               <a:rPr lang="pt-PT" dirty="0"/>
-              <a:t>Objetivo 1: Visão Estratégica (Pipeline Batch)</a:t>
+              <a:t>Objetivo 1: Visão Operacional (Pipeline Streaming - NRT)</a:t>
+            </a:r>
+          </a:p>
+          <a:p>
+            <a:pPr marL="742950" lvl="1" indent="-285750" algn="l">
+              <a:buFont typeface="Arial" panose="020B0604020202020204" pitchFamily="34" charset="0"/>
+              <a:buChar char="•"/>
+            </a:pPr>
+            <a:r>
+              <a:rPr lang="pt-PT" dirty="0"/>
+              <a:t>Fornecer um "raio-x" da operação da frota com baixa latência (Near Real-Time).</a:t>
+            </a:r>
+          </a:p>
+          <a:p>
+            <a:pPr marL="742950" lvl="1" indent="-285750" algn="l">
+              <a:buFont typeface="Arial" panose="020B0604020202020204" pitchFamily="34" charset="0"/>
+              <a:buChar char="•"/>
+            </a:pPr>
+            <a:r>
+              <a:rPr lang="pt-PT" dirty="0"/>
+              <a:t>KPIs-chave: Velocidade média por linha, contagem de ônibus parados/congestionados.</a:t>
+            </a:r>
+          </a:p>
+          <a:p>
+            <a:pPr marL="285750" indent="-285750">
+              <a:buFont typeface="Arial" panose="020B0604020202020204" pitchFamily="34" charset="0"/>
+              <a:buChar char="•"/>
+            </a:pPr>
+            <a:endParaRPr lang="pt-PT" dirty="0"/>
+          </a:p>
+          <a:p>
+            <a:pPr marL="285750" indent="-285750">
+              <a:buFont typeface="Arial" panose="020B0604020202020204" pitchFamily="34" charset="0"/>
+              <a:buChar char="•"/>
+            </a:pPr>
+            <a:r>
+              <a:rPr lang="pt-PT" dirty="0"/>
+              <a:t>Objetivo 2: Visão Estratégica (Pipeline Batch)</a:t>
             </a:r>
           </a:p>
           <a:p>
@@ -1991,59 +2445,6 @@
             <a:r>
               <a:rPr lang="pt-PT" dirty="0"/>
               <a:t>KPIs-chave: Contagem de frota única em operação por hora e análise de velocidade média histórica.</a:t>
-            </a:r>
-          </a:p>
-          <a:p>
-            <a:pPr marL="285750" indent="-285750">
-              <a:buFont typeface="Arial" panose="020B0604020202020204" pitchFamily="34" charset="0"/>
-              <a:buChar char="•"/>
-            </a:pPr>
-            <a:endParaRPr lang="pt-PT" dirty="0"/>
-          </a:p>
-          <a:p>
-            <a:pPr marL="285750" indent="-285750">
-              <a:buFont typeface="Arial" panose="020B0604020202020204" pitchFamily="34" charset="0"/>
-              <a:buChar char="•"/>
-            </a:pPr>
-            <a:r>
-              <a:rPr lang="pt-PT" dirty="0"/>
-              <a:t>Objetivo 2: Visão Operacional (Pipeline Streaming - NRT)</a:t>
-            </a:r>
-          </a:p>
-          <a:p>
-            <a:pPr marL="742950" lvl="1" indent="-285750" algn="l">
-              <a:buFont typeface="Arial" panose="020B0604020202020204" pitchFamily="34" charset="0"/>
-              <a:buChar char="•"/>
-            </a:pPr>
-            <a:r>
-              <a:rPr lang="pt-PT" dirty="0"/>
-              <a:t>Fornecer um "</a:t>
-            </a:r>
-            <a:r>
-              <a:rPr lang="pt-PT" dirty="0" err="1"/>
-              <a:t>raio-x</a:t>
-            </a:r>
-            <a:r>
-              <a:rPr lang="pt-PT" dirty="0"/>
-              <a:t>" da operação da frota com baixa latência (</a:t>
-            </a:r>
-            <a:r>
-              <a:rPr lang="pt-PT" dirty="0" err="1"/>
-              <a:t>near</a:t>
-            </a:r>
-            <a:r>
-              <a:rPr lang="pt-PT" dirty="0"/>
-              <a:t> real-time).</a:t>
-            </a:r>
-          </a:p>
-          <a:p>
-            <a:pPr marL="742950" lvl="1" indent="-285750" algn="l">
-              <a:buFont typeface="Arial" panose="020B0604020202020204" pitchFamily="34" charset="0"/>
-              <a:buChar char="•"/>
-            </a:pPr>
-            <a:r>
-              <a:rPr lang="pt-PT" dirty="0"/>
-              <a:t>KPIs-chave: Velocidade média por linha, contagem de ônibus parados/congestionados.</a:t>
             </a:r>
           </a:p>
           <a:p>
@@ -2079,203 +2480,6 @@
     <p:extLst>
       <p:ext uri="{BB962C8B-B14F-4D97-AF65-F5344CB8AC3E}">
         <p14:creationId xmlns:p14="http://schemas.microsoft.com/office/powerpoint/2010/main" val="3121728925"/>
-      </p:ext>
-    </p:extLst>
-  </p:cSld>
-  <p:clrMapOvr>
-    <a:masterClrMapping/>
-  </p:clrMapOvr>
-</p:sld>
-</file>
-
-<file path=ppt/slides/slide4.xml><?xml version="1.0" encoding="utf-8"?>
-<p:sld xmlns:a="http://schemas.openxmlformats.org/drawingml/2006/main" xmlns:r="http://schemas.openxmlformats.org/officeDocument/2006/relationships" xmlns:p="http://schemas.openxmlformats.org/presentationml/2006/main">
-  <p:cSld>
-    <p:spTree>
-      <p:nvGrpSpPr>
-        <p:cNvPr id="1" name="">
-          <a:extLst>
-            <a:ext uri="{FF2B5EF4-FFF2-40B4-BE49-F238E27FC236}">
-              <a16:creationId xmlns:a16="http://schemas.microsoft.com/office/drawing/2014/main" id="{958E1628-84DB-0C79-C56E-4C057C54D40E}"/>
-            </a:ext>
-          </a:extLst>
-        </p:cNvPr>
-        <p:cNvGrpSpPr/>
-        <p:nvPr/>
-      </p:nvGrpSpPr>
-      <p:grpSpPr>
-        <a:xfrm>
-          <a:off x="0" y="0"/>
-          <a:ext cx="0" cy="0"/>
-          <a:chOff x="0" y="0"/>
-          <a:chExt cx="0" cy="0"/>
-        </a:xfrm>
-      </p:grpSpPr>
-      <p:sp>
-        <p:nvSpPr>
-          <p:cNvPr id="2" name="Título 1">
-            <a:extLst>
-              <a:ext uri="{FF2B5EF4-FFF2-40B4-BE49-F238E27FC236}">
-                <a16:creationId xmlns:a16="http://schemas.microsoft.com/office/drawing/2014/main" id="{B9998F3C-5D5C-9F29-EE6E-9C1CDE15817E}"/>
-              </a:ext>
-            </a:extLst>
-          </p:cNvPr>
-          <p:cNvSpPr>
-            <a:spLocks noGrp="1"/>
-          </p:cNvSpPr>
-          <p:nvPr>
-            <p:ph type="ctrTitle"/>
-          </p:nvPr>
-        </p:nvSpPr>
-        <p:spPr>
-          <a:xfrm>
-            <a:off x="640080" y="1371599"/>
-            <a:ext cx="6675120" cy="552451"/>
-          </a:xfrm>
-        </p:spPr>
-        <p:txBody>
-          <a:bodyPr>
-            <a:normAutofit/>
-          </a:bodyPr>
-          <a:lstStyle/>
-          <a:p>
-            <a:r>
-              <a:rPr lang="pt-PT" sz="2800" dirty="0"/>
-              <a:t>Objetivo 1 - Pipeline Batch (Lote)</a:t>
-            </a:r>
-          </a:p>
-        </p:txBody>
-      </p:sp>
-      <p:sp>
-        <p:nvSpPr>
-          <p:cNvPr id="3" name="Subtítulo 2">
-            <a:extLst>
-              <a:ext uri="{FF2B5EF4-FFF2-40B4-BE49-F238E27FC236}">
-                <a16:creationId xmlns:a16="http://schemas.microsoft.com/office/drawing/2014/main" id="{47F6C3E8-075B-51FF-7A3D-0EEAD5CCAF0B}"/>
-              </a:ext>
-            </a:extLst>
-          </p:cNvPr>
-          <p:cNvSpPr>
-            <a:spLocks noGrp="1"/>
-          </p:cNvSpPr>
-          <p:nvPr>
-            <p:ph type="subTitle" idx="1"/>
-          </p:nvPr>
-        </p:nvSpPr>
-        <p:spPr>
-          <a:xfrm>
-            <a:off x="748200" y="4977249"/>
-            <a:ext cx="11301984" cy="1478871"/>
-          </a:xfrm>
-        </p:spPr>
-        <p:txBody>
-          <a:bodyPr anchor="t">
-            <a:normAutofit fontScale="77500" lnSpcReduction="20000"/>
-          </a:bodyPr>
-          <a:lstStyle/>
-          <a:p>
-            <a:pPr marL="285750" indent="-285750">
-              <a:buFont typeface="Arial" panose="020B0604020202020204" pitchFamily="34" charset="0"/>
-              <a:buChar char="•"/>
-            </a:pPr>
-            <a:r>
-              <a:rPr lang="pt-PT" dirty="0"/>
-              <a:t>Executado no minuto 5 de cada hora, processando movimentos da hora anterior</a:t>
-            </a:r>
-          </a:p>
-          <a:p>
-            <a:pPr marL="285750" indent="-285750">
-              <a:buFont typeface="Arial" panose="020B0604020202020204" pitchFamily="34" charset="0"/>
-              <a:buChar char="•"/>
-            </a:pPr>
-            <a:r>
-              <a:rPr lang="pt-PT" dirty="0"/>
-              <a:t>Coleta e limpeza (Bronze -&gt; Silver)</a:t>
-            </a:r>
-          </a:p>
-          <a:p>
-            <a:pPr marL="285750" indent="-285750">
-              <a:buFont typeface="Arial" panose="020B0604020202020204" pitchFamily="34" charset="0"/>
-              <a:buChar char="•"/>
-            </a:pPr>
-            <a:r>
-              <a:rPr lang="pt-PT" dirty="0"/>
-              <a:t>Agregação e consolidação dos </a:t>
-            </a:r>
-            <a:r>
-              <a:rPr lang="pt-PT" dirty="0" err="1"/>
-              <a:t>kpis</a:t>
-            </a:r>
-            <a:r>
-              <a:rPr lang="pt-PT" dirty="0"/>
-              <a:t> (Silver -&gt; Gold/</a:t>
-            </a:r>
-            <a:r>
-              <a:rPr lang="pt-PT" dirty="0" err="1"/>
-              <a:t>lakehouse</a:t>
-            </a:r>
-            <a:r>
-              <a:rPr lang="pt-PT" dirty="0"/>
-              <a:t>)</a:t>
-            </a:r>
-          </a:p>
-          <a:p>
-            <a:pPr marL="285750" indent="-285750">
-              <a:buFont typeface="Arial" panose="020B0604020202020204" pitchFamily="34" charset="0"/>
-              <a:buChar char="•"/>
-            </a:pPr>
-            <a:r>
-              <a:rPr lang="pt-PT" dirty="0"/>
-              <a:t>Entrega de dados (gold/Lakehouse -&gt; </a:t>
-            </a:r>
-            <a:r>
-              <a:rPr lang="pt-PT" dirty="0" err="1"/>
-              <a:t>Postgresql</a:t>
-            </a:r>
-            <a:r>
-              <a:rPr lang="pt-PT" dirty="0"/>
-              <a:t>)</a:t>
-            </a:r>
-          </a:p>
-          <a:p>
-            <a:endParaRPr lang="pt-PT" dirty="0"/>
-          </a:p>
-        </p:txBody>
-      </p:sp>
-      <p:pic>
-        <p:nvPicPr>
-          <p:cNvPr id="5" name="Imagem 4">
-            <a:extLst>
-              <a:ext uri="{FF2B5EF4-FFF2-40B4-BE49-F238E27FC236}">
-                <a16:creationId xmlns:a16="http://schemas.microsoft.com/office/drawing/2014/main" id="{956799FB-7F2C-A827-66C4-AC4799495012}"/>
-              </a:ext>
-            </a:extLst>
-          </p:cNvPr>
-          <p:cNvPicPr>
-            <a:picLocks noChangeAspect="1"/>
-          </p:cNvPicPr>
-          <p:nvPr/>
-        </p:nvPicPr>
-        <p:blipFill>
-          <a:blip r:embed="rId2"/>
-          <a:stretch>
-            <a:fillRect/>
-          </a:stretch>
-        </p:blipFill>
-        <p:spPr>
-          <a:xfrm>
-            <a:off x="640080" y="2105911"/>
-            <a:ext cx="10061750" cy="2646178"/>
-          </a:xfrm>
-          <a:prstGeom prst="rect">
-            <a:avLst/>
-          </a:prstGeom>
-        </p:spPr>
-      </p:pic>
-    </p:spTree>
-    <p:extLst>
-      <p:ext uri="{BB962C8B-B14F-4D97-AF65-F5344CB8AC3E}">
-        <p14:creationId xmlns:p14="http://schemas.microsoft.com/office/powerpoint/2010/main" val="1616817245"/>
       </p:ext>
     </p:extLst>
   </p:cSld>
@@ -2338,7 +2542,7 @@
           <a:p>
             <a:r>
               <a:rPr lang="pt-PT" sz="2800" dirty="0"/>
-              <a:t>Objetivo 2 - Pipeline Streaming (NRT)</a:t>
+              <a:t>Objetivo 1 - Pipeline Streaming - NRT</a:t>
             </a:r>
           </a:p>
         </p:txBody>
@@ -2362,12 +2566,12 @@
         <p:spPr>
           <a:xfrm>
             <a:off x="640080" y="5205046"/>
-            <a:ext cx="11301984" cy="1259762"/>
+            <a:ext cx="11402568" cy="1259762"/>
           </a:xfrm>
         </p:spPr>
         <p:txBody>
           <a:bodyPr anchor="t">
-            <a:normAutofit fontScale="92500" lnSpcReduction="10000"/>
+            <a:normAutofit fontScale="85000" lnSpcReduction="10000"/>
           </a:bodyPr>
           <a:lstStyle/>
           <a:p>
@@ -2377,7 +2581,7 @@
             </a:pPr>
             <a:r>
               <a:rPr lang="pt-PT" dirty="0"/>
-              <a:t>Atualiza os dashboards a cada 5 minutos</a:t>
+              <a:t>Worker 1 - Coleta e limpeza (kafka -&gt; silver).</a:t>
             </a:r>
           </a:p>
           <a:p>
@@ -2387,15 +2591,7 @@
             </a:pPr>
             <a:r>
               <a:rPr lang="pt-PT" dirty="0"/>
-              <a:t>Coleta e limpeza (</a:t>
-            </a:r>
-            <a:r>
-              <a:rPr lang="pt-PT" dirty="0" err="1"/>
-              <a:t>kafka</a:t>
-            </a:r>
-            <a:r>
-              <a:rPr lang="pt-PT" dirty="0"/>
-              <a:t> -&gt; silver)</a:t>
+              <a:t>Worker 2 - Cálculo de kpis e entrega de dados (silver -&gt; postgresql + Silver).</a:t>
             </a:r>
           </a:p>
           <a:p>
@@ -2404,34 +2600,29 @@
               <a:buChar char="•"/>
             </a:pPr>
             <a:r>
-              <a:rPr lang="pt-PT" dirty="0"/>
-              <a:t>Calculo de </a:t>
-            </a:r>
-            <a:r>
-              <a:rPr lang="pt-PT" dirty="0" err="1"/>
-              <a:t>kpis</a:t>
-            </a:r>
-            <a:r>
-              <a:rPr lang="pt-PT" dirty="0"/>
-              <a:t> e entrega de dados (silver -&gt; </a:t>
-            </a:r>
-            <a:r>
-              <a:rPr lang="pt-PT" dirty="0" err="1"/>
-              <a:t>postgresql</a:t>
-            </a:r>
-            <a:r>
-              <a:rPr lang="pt-PT" dirty="0"/>
-              <a:t>)</a:t>
-            </a:r>
+              <a:rPr lang="pt-PT" dirty="0">
+                <a:solidFill>
+                  <a:srgbClr val="0070C0"/>
+                </a:solidFill>
+              </a:rPr>
+              <a:t>Resultado: dados para os dashboards nrt atualizados a cada 4 minutos.</a:t>
+            </a:r>
+          </a:p>
+          <a:p>
+            <a:pPr marL="285750" indent="-285750">
+              <a:buFont typeface="Arial" panose="020B0604020202020204" pitchFamily="34" charset="0"/>
+              <a:buChar char="•"/>
+            </a:pPr>
+            <a:endParaRPr lang="pt-PT" dirty="0"/>
           </a:p>
         </p:txBody>
       </p:sp>
       <p:pic>
         <p:nvPicPr>
-          <p:cNvPr id="5" name="Imagem 4">
-            <a:extLst>
-              <a:ext uri="{FF2B5EF4-FFF2-40B4-BE49-F238E27FC236}">
-                <a16:creationId xmlns:a16="http://schemas.microsoft.com/office/drawing/2014/main" id="{106A5C82-5F6A-B376-F10D-422DB4D06229}"/>
+          <p:cNvPr id="10" name="Imagem 9">
+            <a:extLst>
+              <a:ext uri="{FF2B5EF4-FFF2-40B4-BE49-F238E27FC236}">
+                <a16:creationId xmlns:a16="http://schemas.microsoft.com/office/drawing/2014/main" id="{1F1FE4AB-BC81-28F8-66E3-CA75A5B8AAF4}"/>
               </a:ext>
             </a:extLst>
           </p:cNvPr>
@@ -2448,8 +2639,8 @@
         </p:blipFill>
         <p:spPr>
           <a:xfrm>
-            <a:off x="562708" y="2167221"/>
-            <a:ext cx="10420141" cy="2794654"/>
+            <a:off x="838353" y="2223503"/>
+            <a:ext cx="10515294" cy="2710448"/>
           </a:xfrm>
           <a:prstGeom prst="rect">
             <a:avLst/>
@@ -2477,6 +2668,199 @@
         <p:cNvPr id="1" name="">
           <a:extLst>
             <a:ext uri="{FF2B5EF4-FFF2-40B4-BE49-F238E27FC236}">
+              <a16:creationId xmlns:a16="http://schemas.microsoft.com/office/drawing/2014/main" id="{958E1628-84DB-0C79-C56E-4C057C54D40E}"/>
+            </a:ext>
+          </a:extLst>
+        </p:cNvPr>
+        <p:cNvGrpSpPr/>
+        <p:nvPr/>
+      </p:nvGrpSpPr>
+      <p:grpSpPr>
+        <a:xfrm>
+          <a:off x="0" y="0"/>
+          <a:ext cx="0" cy="0"/>
+          <a:chOff x="0" y="0"/>
+          <a:chExt cx="0" cy="0"/>
+        </a:xfrm>
+      </p:grpSpPr>
+      <p:sp>
+        <p:nvSpPr>
+          <p:cNvPr id="2" name="Título 1">
+            <a:extLst>
+              <a:ext uri="{FF2B5EF4-FFF2-40B4-BE49-F238E27FC236}">
+                <a16:creationId xmlns:a16="http://schemas.microsoft.com/office/drawing/2014/main" id="{B9998F3C-5D5C-9F29-EE6E-9C1CDE15817E}"/>
+              </a:ext>
+            </a:extLst>
+          </p:cNvPr>
+          <p:cNvSpPr>
+            <a:spLocks noGrp="1"/>
+          </p:cNvSpPr>
+          <p:nvPr>
+            <p:ph type="ctrTitle"/>
+          </p:nvPr>
+        </p:nvSpPr>
+        <p:spPr>
+          <a:xfrm>
+            <a:off x="640080" y="1371599"/>
+            <a:ext cx="6675120" cy="552451"/>
+          </a:xfrm>
+        </p:spPr>
+        <p:txBody>
+          <a:bodyPr>
+            <a:normAutofit/>
+          </a:bodyPr>
+          <a:lstStyle/>
+          <a:p>
+            <a:r>
+              <a:rPr lang="pt-PT" sz="2800" dirty="0"/>
+              <a:t>Objetivo 2 - Pipeline Batch</a:t>
+            </a:r>
+          </a:p>
+        </p:txBody>
+      </p:sp>
+      <p:sp>
+        <p:nvSpPr>
+          <p:cNvPr id="3" name="Subtítulo 2">
+            <a:extLst>
+              <a:ext uri="{FF2B5EF4-FFF2-40B4-BE49-F238E27FC236}">
+                <a16:creationId xmlns:a16="http://schemas.microsoft.com/office/drawing/2014/main" id="{47F6C3E8-075B-51FF-7A3D-0EEAD5CCAF0B}"/>
+              </a:ext>
+            </a:extLst>
+          </p:cNvPr>
+          <p:cNvSpPr>
+            <a:spLocks noGrp="1"/>
+          </p:cNvSpPr>
+          <p:nvPr>
+            <p:ph type="subTitle" idx="1"/>
+          </p:nvPr>
+        </p:nvSpPr>
+        <p:spPr>
+          <a:xfrm>
+            <a:off x="748200" y="4933951"/>
+            <a:ext cx="11301984" cy="1741170"/>
+          </a:xfrm>
+        </p:spPr>
+        <p:txBody>
+          <a:bodyPr anchor="t">
+            <a:normAutofit fontScale="85000" lnSpcReduction="20000"/>
+          </a:bodyPr>
+          <a:lstStyle/>
+          <a:p>
+            <a:pPr marL="285750" indent="-285750">
+              <a:buFont typeface="Arial" panose="020B0604020202020204" pitchFamily="34" charset="0"/>
+              <a:buChar char="•"/>
+            </a:pPr>
+            <a:r>
+              <a:rPr lang="pt-PT" dirty="0"/>
+              <a:t>Dag 1 - Coleta e limpeza (Bronze -&gt; Silver).</a:t>
+            </a:r>
+          </a:p>
+          <a:p>
+            <a:pPr marL="285750" indent="-285750">
+              <a:buFont typeface="Arial" panose="020B0604020202020204" pitchFamily="34" charset="0"/>
+              <a:buChar char="•"/>
+            </a:pPr>
+            <a:r>
+              <a:rPr lang="pt-PT" dirty="0"/>
+              <a:t>Dag 2 - Agregação e consolidação dos kpis (Silver -&gt; Gold/</a:t>
+            </a:r>
+            <a:r>
+              <a:rPr lang="pt-PT" dirty="0" err="1"/>
+              <a:t>lakehouse</a:t>
+            </a:r>
+            <a:r>
+              <a:rPr lang="pt-PT" dirty="0"/>
+              <a:t>).</a:t>
+            </a:r>
+          </a:p>
+          <a:p>
+            <a:pPr marL="285750" indent="-285750">
+              <a:buFont typeface="Arial" panose="020B0604020202020204" pitchFamily="34" charset="0"/>
+              <a:buChar char="•"/>
+            </a:pPr>
+            <a:r>
+              <a:rPr lang="pt-PT" dirty="0"/>
+              <a:t>Dag 2 - entrega de dados (Gold/</a:t>
+            </a:r>
+            <a:r>
+              <a:rPr lang="pt-PT" dirty="0" err="1"/>
+              <a:t>lakehouse</a:t>
+            </a:r>
+            <a:r>
+              <a:rPr lang="pt-PT" dirty="0"/>
+              <a:t> -&gt; postgresql).</a:t>
+            </a:r>
+          </a:p>
+          <a:p>
+            <a:pPr marL="285750" indent="-285750">
+              <a:buFont typeface="Arial" panose="020B0604020202020204" pitchFamily="34" charset="0"/>
+              <a:buChar char="•"/>
+            </a:pPr>
+            <a:r>
+              <a:rPr lang="pt-PT" dirty="0">
+                <a:solidFill>
+                  <a:srgbClr val="0070C0"/>
+                </a:solidFill>
+              </a:rPr>
+              <a:t>Resultado: dados para os dashboards históricos consolidados e atualizados a cada hora.</a:t>
+            </a:r>
+          </a:p>
+          <a:p>
+            <a:endParaRPr lang="pt-PT" dirty="0"/>
+          </a:p>
+        </p:txBody>
+      </p:sp>
+      <p:pic>
+        <p:nvPicPr>
+          <p:cNvPr id="14" name="Imagem 13">
+            <a:extLst>
+              <a:ext uri="{FF2B5EF4-FFF2-40B4-BE49-F238E27FC236}">
+                <a16:creationId xmlns:a16="http://schemas.microsoft.com/office/drawing/2014/main" id="{F28E0186-A3F2-16AC-B963-9BED530196C4}"/>
+              </a:ext>
+            </a:extLst>
+          </p:cNvPr>
+          <p:cNvPicPr>
+            <a:picLocks noChangeAspect="1"/>
+          </p:cNvPicPr>
+          <p:nvPr/>
+        </p:nvPicPr>
+        <p:blipFill>
+          <a:blip r:embed="rId2"/>
+          <a:stretch>
+            <a:fillRect/>
+          </a:stretch>
+        </p:blipFill>
+        <p:spPr>
+          <a:xfrm>
+            <a:off x="850393" y="1880751"/>
+            <a:ext cx="10305288" cy="2715873"/>
+          </a:xfrm>
+          <a:prstGeom prst="rect">
+            <a:avLst/>
+          </a:prstGeom>
+        </p:spPr>
+      </p:pic>
+    </p:spTree>
+    <p:extLst>
+      <p:ext uri="{BB962C8B-B14F-4D97-AF65-F5344CB8AC3E}">
+        <p14:creationId xmlns:p14="http://schemas.microsoft.com/office/powerpoint/2010/main" val="1616817245"/>
+      </p:ext>
+    </p:extLst>
+  </p:cSld>
+  <p:clrMapOvr>
+    <a:masterClrMapping/>
+  </p:clrMapOvr>
+</p:sld>
+</file>
+
+<file path=ppt/slides/slide7.xml><?xml version="1.0" encoding="utf-8"?>
+<p:sld xmlns:a="http://schemas.openxmlformats.org/drawingml/2006/main" xmlns:r="http://schemas.openxmlformats.org/officeDocument/2006/relationships" xmlns:p="http://schemas.openxmlformats.org/presentationml/2006/main">
+  <p:cSld>
+    <p:spTree>
+      <p:nvGrpSpPr>
+        <p:cNvPr id="1" name="">
+          <a:extLst>
+            <a:ext uri="{FF2B5EF4-FFF2-40B4-BE49-F238E27FC236}">
               <a16:creationId xmlns:a16="http://schemas.microsoft.com/office/drawing/2014/main" id="{95095784-CEAE-21E1-FE32-F0D897E98476}"/>
             </a:ext>
           </a:extLst>
@@ -2511,36 +2895,28 @@
         <p:spPr>
           <a:xfrm>
             <a:off x="640080" y="1371599"/>
-            <a:ext cx="7539278" cy="552451"/>
+            <a:ext cx="9628632" cy="552451"/>
           </a:xfrm>
         </p:spPr>
         <p:txBody>
           <a:bodyPr>
-            <a:normAutofit/>
+            <a:normAutofit fontScale="90000"/>
           </a:bodyPr>
           <a:lstStyle/>
           <a:p>
             <a:r>
               <a:rPr lang="pt-PT" sz="2800" dirty="0"/>
-              <a:t>Objetivo 3 - Arquitetura Unificada (</a:t>
-            </a:r>
-            <a:r>
-              <a:rPr lang="pt-PT" sz="2800" dirty="0" err="1"/>
-              <a:t>Landscape</a:t>
-            </a:r>
-            <a:r>
-              <a:rPr lang="pt-PT" sz="2800" dirty="0"/>
-              <a:t>)</a:t>
+              <a:t>Objetivo 3 - Arquitetura Unificada (Pipelines Batch e Streaming)</a:t>
             </a:r>
           </a:p>
         </p:txBody>
       </p:sp>
       <p:pic>
         <p:nvPicPr>
-          <p:cNvPr id="4" name="Imagem 3">
-            <a:extLst>
-              <a:ext uri="{FF2B5EF4-FFF2-40B4-BE49-F238E27FC236}">
-                <a16:creationId xmlns:a16="http://schemas.microsoft.com/office/drawing/2014/main" id="{0DCD828F-16ED-5584-1DF7-2D9806B38784}"/>
+          <p:cNvPr id="5" name="Imagem 4">
+            <a:extLst>
+              <a:ext uri="{FF2B5EF4-FFF2-40B4-BE49-F238E27FC236}">
+                <a16:creationId xmlns:a16="http://schemas.microsoft.com/office/drawing/2014/main" id="{8DEE3A27-1048-ADCF-2688-0AC21F039B4B}"/>
               </a:ext>
             </a:extLst>
           </p:cNvPr>
@@ -2557,8 +2933,8 @@
         </p:blipFill>
         <p:spPr>
           <a:xfrm>
-            <a:off x="797052" y="2144514"/>
-            <a:ext cx="10597896" cy="4038921"/>
+            <a:off x="622522" y="2085975"/>
+            <a:ext cx="10946955" cy="4171950"/>
           </a:xfrm>
           <a:prstGeom prst="rect">
             <a:avLst/>
@@ -2578,7 +2954,7 @@
 </p:sld>
 </file>
 
-<file path=ppt/slides/slide7.xml><?xml version="1.0" encoding="utf-8"?>
+<file path=ppt/slides/slide8.xml><?xml version="1.0" encoding="utf-8"?>
 <p:sld xmlns:a="http://schemas.openxmlformats.org/drawingml/2006/main" xmlns:r="http://schemas.openxmlformats.org/officeDocument/2006/relationships" xmlns:p="http://schemas.openxmlformats.org/presentationml/2006/main">
   <p:cSld>
     <p:spTree>
@@ -2634,12 +3010,8 @@
               <a:t>Ferramentas e T</a:t>
             </a:r>
             <a:r>
-              <a:rPr lang="pt-PT" sz="2800" dirty="0" err="1"/>
-              <a:t>ecnologias</a:t>
-            </a:r>
-            <a:r>
               <a:rPr lang="pt-PT" sz="2800" dirty="0"/>
-              <a:t> – Parte 1</a:t>
+              <a:t>ecnologias – Parte 1</a:t>
             </a:r>
           </a:p>
         </p:txBody>
@@ -2738,7 +3110,7 @@
         </p:nvCxnSpPr>
         <p:spPr>
           <a:xfrm>
-            <a:off x="5166360" y="2249424"/>
+            <a:off x="5239512" y="2221992"/>
             <a:ext cx="0" cy="4379976"/>
           </a:xfrm>
           <a:prstGeom prst="line">
@@ -3088,7 +3460,7 @@
 </p:sld>
 </file>
 
-<file path=ppt/slides/slide8.xml><?xml version="1.0" encoding="utf-8"?>
+<file path=ppt/slides/slide9.xml><?xml version="1.0" encoding="utf-8"?>
 <p:sld xmlns:a="http://schemas.openxmlformats.org/drawingml/2006/main" xmlns:r="http://schemas.openxmlformats.org/officeDocument/2006/relationships" xmlns:p="http://schemas.openxmlformats.org/presentationml/2006/main">
   <p:cSld>
     <p:spTree>
@@ -3144,12 +3516,8 @@
               <a:t>Ferramentas e T</a:t>
             </a:r>
             <a:r>
-              <a:rPr lang="pt-PT" sz="2800" dirty="0" err="1"/>
-              <a:t>ecnologias</a:t>
-            </a:r>
-            <a:r>
               <a:rPr lang="pt-PT" sz="2800" dirty="0"/>
-              <a:t> – Parte 2</a:t>
+              <a:t>ecnologias – Parte 2</a:t>
             </a:r>
           </a:p>
         </p:txBody>
@@ -4173,10 +4541,10 @@
       </p:pic>
       <p:pic>
         <p:nvPicPr>
-          <p:cNvPr id="10" name="Imagem 9">
-            <a:extLst>
-              <a:ext uri="{FF2B5EF4-FFF2-40B4-BE49-F238E27FC236}">
-                <a16:creationId xmlns:a16="http://schemas.microsoft.com/office/drawing/2014/main" id="{8898115A-5B12-4036-1FFE-01A4C05F5BEF}"/>
+          <p:cNvPr id="8" name="Imagem 7">
+            <a:extLst>
+              <a:ext uri="{FF2B5EF4-FFF2-40B4-BE49-F238E27FC236}">
+                <a16:creationId xmlns:a16="http://schemas.microsoft.com/office/drawing/2014/main" id="{BBCCE95F-DEA1-7C1C-5DE6-3EE072B297C3}"/>
               </a:ext>
             </a:extLst>
           </p:cNvPr>
@@ -4193,8 +4561,8 @@
         </p:blipFill>
         <p:spPr>
           <a:xfrm>
-            <a:off x="7315200" y="4085653"/>
-            <a:ext cx="4387814" cy="1860206"/>
+            <a:off x="7315200" y="4003530"/>
+            <a:ext cx="4581524" cy="1942329"/>
           </a:xfrm>
           <a:prstGeom prst="rect">
             <a:avLst/>
@@ -4205,113 +4573,6 @@
     <p:extLst>
       <p:ext uri="{BB962C8B-B14F-4D97-AF65-F5344CB8AC3E}">
         <p14:creationId xmlns:p14="http://schemas.microsoft.com/office/powerpoint/2010/main" val="369069384"/>
-      </p:ext>
-    </p:extLst>
-  </p:cSld>
-  <p:clrMapOvr>
-    <a:masterClrMapping/>
-  </p:clrMapOvr>
-</p:sld>
-</file>
-
-<file path=ppt/slides/slide9.xml><?xml version="1.0" encoding="utf-8"?>
-<p:sld xmlns:a="http://schemas.openxmlformats.org/drawingml/2006/main" xmlns:r="http://schemas.openxmlformats.org/officeDocument/2006/relationships" xmlns:p="http://schemas.openxmlformats.org/presentationml/2006/main">
-  <p:cSld>
-    <p:spTree>
-      <p:nvGrpSpPr>
-        <p:cNvPr id="1" name="">
-          <a:extLst>
-            <a:ext uri="{FF2B5EF4-FFF2-40B4-BE49-F238E27FC236}">
-              <a16:creationId xmlns:a16="http://schemas.microsoft.com/office/drawing/2014/main" id="{FB5E3759-BB3A-3F7E-3468-5FAEF11FE0C4}"/>
-            </a:ext>
-          </a:extLst>
-        </p:cNvPr>
-        <p:cNvGrpSpPr/>
-        <p:nvPr/>
-      </p:nvGrpSpPr>
-      <p:grpSpPr>
-        <a:xfrm>
-          <a:off x="0" y="0"/>
-          <a:ext cx="0" cy="0"/>
-          <a:chOff x="0" y="0"/>
-          <a:chExt cx="0" cy="0"/>
-        </a:xfrm>
-      </p:grpSpPr>
-      <p:sp>
-        <p:nvSpPr>
-          <p:cNvPr id="2" name="Título 1">
-            <a:extLst>
-              <a:ext uri="{FF2B5EF4-FFF2-40B4-BE49-F238E27FC236}">
-                <a16:creationId xmlns:a16="http://schemas.microsoft.com/office/drawing/2014/main" id="{E0DCB332-670C-E332-1D2D-AA8945DEE611}"/>
-              </a:ext>
-            </a:extLst>
-          </p:cNvPr>
-          <p:cNvSpPr>
-            <a:spLocks noGrp="1"/>
-          </p:cNvSpPr>
-          <p:nvPr>
-            <p:ph type="ctrTitle"/>
-          </p:nvPr>
-        </p:nvSpPr>
-        <p:spPr>
-          <a:xfrm>
-            <a:off x="640080" y="1371599"/>
-            <a:ext cx="6675120" cy="552451"/>
-          </a:xfrm>
-        </p:spPr>
-        <p:txBody>
-          <a:bodyPr>
-            <a:normAutofit/>
-          </a:bodyPr>
-          <a:lstStyle/>
-          <a:p>
-            <a:r>
-              <a:rPr lang="pt-PT" sz="2800" dirty="0"/>
-              <a:t>Demonstração</a:t>
-            </a:r>
-          </a:p>
-        </p:txBody>
-      </p:sp>
-      <p:sp>
-        <p:nvSpPr>
-          <p:cNvPr id="3" name="Subtítulo 2">
-            <a:extLst>
-              <a:ext uri="{FF2B5EF4-FFF2-40B4-BE49-F238E27FC236}">
-                <a16:creationId xmlns:a16="http://schemas.microsoft.com/office/drawing/2014/main" id="{FA356A1B-E9BF-9F0A-E988-EDFD96B04B38}"/>
-              </a:ext>
-            </a:extLst>
-          </p:cNvPr>
-          <p:cNvSpPr>
-            <a:spLocks noGrp="1"/>
-          </p:cNvSpPr>
-          <p:nvPr>
-            <p:ph type="subTitle" idx="1"/>
-          </p:nvPr>
-        </p:nvSpPr>
-        <p:spPr>
-          <a:xfrm>
-            <a:off x="640080" y="2404871"/>
-            <a:ext cx="11301984" cy="4059937"/>
-          </a:xfrm>
-        </p:spPr>
-        <p:txBody>
-          <a:bodyPr anchor="t">
-            <a:normAutofit/>
-          </a:bodyPr>
-          <a:lstStyle/>
-          <a:p>
-            <a:pPr marL="285750" indent="-285750">
-              <a:buFont typeface="Arial" panose="020B0604020202020204" pitchFamily="34" charset="0"/>
-              <a:buChar char="•"/>
-            </a:pPr>
-            <a:endParaRPr lang="pt-PT" dirty="0"/>
-          </a:p>
-        </p:txBody>
-      </p:sp>
-    </p:spTree>
-    <p:extLst>
-      <p:ext uri="{BB962C8B-B14F-4D97-AF65-F5344CB8AC3E}">
-        <p14:creationId xmlns:p14="http://schemas.microsoft.com/office/powerpoint/2010/main" val="396005196"/>
       </p:ext>
     </p:extLst>
   </p:cSld>

</xml_diff>

<commit_message>
Ajustes na documentação e apresentação.
</commit_message>
<xml_diff>
--- a/documentacoes/Apresentação_Projeto_Final.pptx
+++ b/documentacoes/Apresentação_Projeto_Final.pptx
@@ -277,7 +277,7 @@
           <a:p>
             <a:fld id="{6444479B-705B-4489-957E-7E8A228BDFA0}" type="datetime1">
               <a:rPr lang="en-US" smtClean="0"/>
-              <a:t>10/30/2025</a:t>
+              <a:t>11/3/2025</a:t>
             </a:fld>
             <a:endParaRPr lang="en-US"/>
           </a:p>
@@ -516,7 +516,7 @@
           <a:p>
             <a:fld id="{7DA38F49-B3E2-4BF0-BEC7-C30D34ABBB8D}" type="datetime1">
               <a:rPr lang="en-US" smtClean="0"/>
-              <a:t>10/30/2025</a:t>
+              <a:t>11/3/2025</a:t>
             </a:fld>
             <a:endParaRPr lang="en-US"/>
           </a:p>
@@ -1440,8 +1440,8 @@
         </p:nvSpPr>
         <p:spPr>
           <a:xfrm>
-            <a:off x="640080" y="2404871"/>
-            <a:ext cx="11301984" cy="2221993"/>
+            <a:off x="640080" y="2139697"/>
+            <a:ext cx="11301984" cy="4215384"/>
           </a:xfrm>
         </p:spPr>
         <p:txBody>
@@ -1456,12 +1456,56 @@
             </a:pPr>
             <a:r>
               <a:rPr lang="pt-BR" dirty="0"/>
-              <a:t>Dashboards no metabase</a:t>
+              <a:t>PROCESSAMENTO:</a:t>
+            </a:r>
+          </a:p>
+          <a:p>
+            <a:pPr marL="742950" lvl="1" indent="-285750" algn="l">
+              <a:buFont typeface="Arial" panose="020B0604020202020204" pitchFamily="34" charset="0"/>
+              <a:buChar char="•"/>
+            </a:pPr>
+            <a:r>
+              <a:rPr lang="pt-BR" dirty="0" err="1"/>
+              <a:t>DagS</a:t>
+            </a:r>
+            <a:r>
+              <a:rPr lang="pt-BR" dirty="0"/>
+              <a:t> do Airflow.</a:t>
+            </a:r>
+          </a:p>
+          <a:p>
+            <a:pPr marL="742950" lvl="1" indent="-285750" algn="l">
+              <a:buFont typeface="Arial" panose="020B0604020202020204" pitchFamily="34" charset="0"/>
+              <a:buChar char="•"/>
+            </a:pPr>
+            <a:r>
+              <a:rPr lang="pt-BR" dirty="0"/>
+              <a:t>Processamento dos micro-lotes com Spark streaming.</a:t>
+            </a:r>
+          </a:p>
+          <a:p>
+            <a:pPr marL="285750" indent="-285750">
+              <a:buFont typeface="Arial" panose="020B0604020202020204" pitchFamily="34" charset="0"/>
+              <a:buChar char="•"/>
+            </a:pPr>
+            <a:r>
+              <a:rPr lang="pt-BR" dirty="0"/>
+              <a:t>ENTREGA DE DADOS:</a:t>
+            </a:r>
+          </a:p>
+          <a:p>
+            <a:pPr marL="742950" lvl="1" indent="-285750" algn="l">
+              <a:buFont typeface="Arial" panose="020B0604020202020204" pitchFamily="34" charset="0"/>
+              <a:buChar char="•"/>
+            </a:pPr>
+            <a:r>
+              <a:rPr lang="pt-BR" dirty="0"/>
+              <a:t>Dashboards no metabase:</a:t>
             </a:r>
             <a:endParaRPr lang="pt-PT" dirty="0"/>
           </a:p>
           <a:p>
-            <a:pPr marL="742950" lvl="1" indent="-285750" algn="l">
+            <a:pPr marL="1657350" lvl="3" indent="-285750" algn="l">
               <a:buFont typeface="Arial" panose="020B0604020202020204" pitchFamily="34" charset="0"/>
               <a:buChar char="•"/>
             </a:pPr>
@@ -1471,7 +1515,7 @@
             </a:r>
           </a:p>
           <a:p>
-            <a:pPr marL="742950" lvl="1" indent="-285750" algn="l">
+            <a:pPr marL="1657350" lvl="3" indent="-285750" algn="l">
               <a:buFont typeface="Arial" panose="020B0604020202020204" pitchFamily="34" charset="0"/>
               <a:buChar char="•"/>
             </a:pPr>
@@ -1485,18 +1529,28 @@
               <a:buFont typeface="Arial" panose="020B0604020202020204" pitchFamily="34" charset="0"/>
               <a:buChar char="•"/>
             </a:pPr>
-            <a:endParaRPr lang="pt-PT" dirty="0"/>
-          </a:p>
-          <a:p>
-            <a:pPr marL="285750" indent="-285750">
-              <a:buFont typeface="Arial" panose="020B0604020202020204" pitchFamily="34" charset="0"/>
-              <a:buChar char="•"/>
-            </a:pPr>
-            <a:r>
-              <a:rPr lang="pt-BR" dirty="0"/>
-              <a:t>Processamento dos micro-lotes com Spark streaming.</a:t>
-            </a:r>
-            <a:endParaRPr lang="pt-PT" dirty="0"/>
+            <a:r>
+              <a:rPr lang="pt-PT" dirty="0"/>
+              <a:t>APIs no </a:t>
+            </a:r>
+            <a:r>
+              <a:rPr lang="pt-PT" dirty="0" err="1"/>
+              <a:t>Postman</a:t>
+            </a:r>
+            <a:r>
+              <a:rPr lang="pt-PT" dirty="0"/>
+              <a:t>.</a:t>
+            </a:r>
+          </a:p>
+          <a:p>
+            <a:pPr marL="742950" lvl="1" indent="-285750" algn="l">
+              <a:buFont typeface="Arial" panose="020B0604020202020204" pitchFamily="34" charset="0"/>
+              <a:buChar char="•"/>
+            </a:pPr>
+            <a:r>
+              <a:rPr lang="pt-PT" dirty="0"/>
+              <a:t>Acesso aos dados federados via Trino.</a:t>
+            </a:r>
           </a:p>
         </p:txBody>
       </p:sp>
@@ -1595,7 +1649,7 @@
         </p:spPr>
         <p:txBody>
           <a:bodyPr anchor="t">
-            <a:normAutofit fontScale="77500" lnSpcReduction="20000"/>
+            <a:normAutofit fontScale="85000" lnSpcReduction="20000"/>
           </a:bodyPr>
           <a:lstStyle/>
           <a:p>
@@ -1645,7 +1699,11 @@
             </a:pPr>
             <a:r>
               <a:rPr lang="pt-PT" b="1" dirty="0"/>
-              <a:t>Dados acessíveis de forma federada.</a:t>
+              <a:t>Dados acessíveis de diferentes formas: </a:t>
+            </a:r>
+            <a:r>
+              <a:rPr lang="pt-PT" dirty="0"/>
+              <a:t>Dashboards, API’s e via Trino.</a:t>
             </a:r>
           </a:p>
           <a:p>
@@ -1699,20 +1757,6 @@
             <a:r>
               <a:rPr lang="pt-PT" dirty="0"/>
               <a:t> ou GCP.</a:t>
-            </a:r>
-          </a:p>
-          <a:p>
-            <a:pPr marL="742950" lvl="1" indent="-285750" algn="l">
-              <a:buFont typeface="Arial" panose="020B0604020202020204" pitchFamily="34" charset="0"/>
-              <a:buChar char="•"/>
-            </a:pPr>
-            <a:r>
-              <a:rPr lang="pt-PT" b="1" dirty="0"/>
-              <a:t>Alertas: </a:t>
-            </a:r>
-            <a:r>
-              <a:rPr lang="pt-PT" dirty="0"/>
-              <a:t>Criar alertas automáticos (Ex: "Linha 8000 está com velocidade abaixo de 5km/h há 10 minutos").</a:t>
             </a:r>
           </a:p>
           <a:p>
@@ -2377,7 +2421,7 @@
         </p:spPr>
         <p:txBody>
           <a:bodyPr anchor="t">
-            <a:normAutofit fontScale="85000" lnSpcReduction="10000"/>
+            <a:normAutofit fontScale="92500" lnSpcReduction="10000"/>
           </a:bodyPr>
           <a:lstStyle/>
           <a:p>
@@ -2407,7 +2451,7 @@
             </a:pPr>
             <a:r>
               <a:rPr lang="pt-PT" dirty="0"/>
-              <a:t>KPIs-chave: Velocidade média por linha, contagem de ônibus parados/congestionados.</a:t>
+              <a:t>KPIs-chave: Velocidade média por linha e contagem de ônibus parados/congestionados.</a:t>
             </a:r>
           </a:p>
           <a:p>
@@ -2444,7 +2488,7 @@
             </a:pPr>
             <a:r>
               <a:rPr lang="pt-PT" dirty="0"/>
-              <a:t>KPIs-chave: Contagem de frota única em operação por hora e análise de velocidade média histórica.</a:t>
+              <a:t>KPIs-chave: Velocidade média histórica e contagem de ônibus parados/parados por hora.</a:t>
             </a:r>
           </a:p>
           <a:p>
@@ -2762,33 +2806,17 @@
             </a:pPr>
             <a:r>
               <a:rPr lang="pt-PT" sz="1300" dirty="0"/>
-              <a:t>Dag 2 - Agregação e consolidação dos kpis (Silver -&gt; Gold/</a:t>
-            </a:r>
-            <a:r>
-              <a:rPr lang="pt-PT" sz="1300" dirty="0" err="1"/>
-              <a:t>lakehouse</a:t>
-            </a:r>
+              <a:t>Dag 2 - Agregação e consolidação dos kpis (Silver -&gt; Gold/lakehouse).</a:t>
+            </a:r>
+          </a:p>
+          <a:p>
+            <a:pPr marL="285750" indent="-285750">
+              <a:buFont typeface="Arial" panose="020B0604020202020204" pitchFamily="34" charset="0"/>
+              <a:buChar char="•"/>
+            </a:pPr>
             <a:r>
               <a:rPr lang="pt-PT" sz="1300" dirty="0"/>
-              <a:t>).</a:t>
-            </a:r>
-          </a:p>
-          <a:p>
-            <a:pPr marL="285750" indent="-285750">
-              <a:buFont typeface="Arial" panose="020B0604020202020204" pitchFamily="34" charset="0"/>
-              <a:buChar char="•"/>
-            </a:pPr>
-            <a:r>
-              <a:rPr lang="pt-PT" sz="1300" dirty="0"/>
-              <a:t>Dag 2 - entrega de dados (Gold/</a:t>
-            </a:r>
-            <a:r>
-              <a:rPr lang="pt-PT" sz="1300" dirty="0" err="1"/>
-              <a:t>lakehouse</a:t>
-            </a:r>
-            <a:r>
-              <a:rPr lang="pt-PT" sz="1300" dirty="0"/>
-              <a:t> -&gt; postgresql).</a:t>
+              <a:t>Dag 2 - entrega de dados (Gold/lakehouse -&gt; postgresql).</a:t>
             </a:r>
           </a:p>
           <a:p>
@@ -2891,13 +2919,13 @@
         </p:nvSpPr>
         <p:spPr>
           <a:xfrm>
-            <a:off x="640080" y="1371599"/>
-            <a:ext cx="9628632" cy="552451"/>
+            <a:off x="640079" y="1371599"/>
+            <a:ext cx="10946955" cy="552451"/>
           </a:xfrm>
         </p:spPr>
         <p:txBody>
           <a:bodyPr>
-            <a:normAutofit fontScale="90000"/>
+            <a:noAutofit/>
           </a:bodyPr>
           <a:lstStyle/>
           <a:p>
@@ -3436,7 +3464,7 @@
         </p:blipFill>
         <p:spPr>
           <a:xfrm>
-            <a:off x="5565179" y="3892034"/>
+            <a:off x="5601755" y="3623668"/>
             <a:ext cx="5751042" cy="2476143"/>
           </a:xfrm>
           <a:prstGeom prst="rect">
@@ -4508,10 +4536,10 @@
       </p:sp>
       <p:pic>
         <p:nvPicPr>
-          <p:cNvPr id="26" name="Imagem 25">
-            <a:extLst>
-              <a:ext uri="{FF2B5EF4-FFF2-40B4-BE49-F238E27FC236}">
-                <a16:creationId xmlns:a16="http://schemas.microsoft.com/office/drawing/2014/main" id="{FA7DA93F-8F85-599B-407A-846245212EE2}"/>
+          <p:cNvPr id="8" name="Imagem 7">
+            <a:extLst>
+              <a:ext uri="{FF2B5EF4-FFF2-40B4-BE49-F238E27FC236}">
+                <a16:creationId xmlns:a16="http://schemas.microsoft.com/office/drawing/2014/main" id="{BBCCE95F-DEA1-7C1C-5DE6-3EE072B297C3}"/>
               </a:ext>
             </a:extLst>
           </p:cNvPr>
@@ -4528,8 +4556,8 @@
         </p:blipFill>
         <p:spPr>
           <a:xfrm>
-            <a:off x="122907" y="3440457"/>
-            <a:ext cx="6735111" cy="2505402"/>
+            <a:off x="7315200" y="4003530"/>
+            <a:ext cx="4581524" cy="1942329"/>
           </a:xfrm>
           <a:prstGeom prst="rect">
             <a:avLst/>
@@ -4538,10 +4566,10 @@
       </p:pic>
       <p:pic>
         <p:nvPicPr>
-          <p:cNvPr id="8" name="Imagem 7">
-            <a:extLst>
-              <a:ext uri="{FF2B5EF4-FFF2-40B4-BE49-F238E27FC236}">
-                <a16:creationId xmlns:a16="http://schemas.microsoft.com/office/drawing/2014/main" id="{BBCCE95F-DEA1-7C1C-5DE6-3EE072B297C3}"/>
+          <p:cNvPr id="5" name="Imagem 4">
+            <a:extLst>
+              <a:ext uri="{FF2B5EF4-FFF2-40B4-BE49-F238E27FC236}">
+                <a16:creationId xmlns:a16="http://schemas.microsoft.com/office/drawing/2014/main" id="{0E40D4A2-68C9-9F34-9E6D-DE6B9AFE0557}"/>
               </a:ext>
             </a:extLst>
           </p:cNvPr>
@@ -4558,8 +4586,8 @@
         </p:blipFill>
         <p:spPr>
           <a:xfrm>
-            <a:off x="7315200" y="4003530"/>
-            <a:ext cx="4581524" cy="1942329"/>
+            <a:off x="88590" y="3403880"/>
+            <a:ext cx="6833438" cy="2541979"/>
           </a:xfrm>
           <a:prstGeom prst="rect">
             <a:avLst/>

</xml_diff>